<commit_message>
Update dependencies to fix security vulnerability
</commit_message>
<xml_diff>
--- a/EFPerf.pptx
+++ b/EFPerf.pptx
@@ -6,10 +6,10 @@
     <p:sldMasterId id="2147483850" r:id="rId5"/>
   </p:sldMasterIdLst>
   <p:notesMasterIdLst>
-    <p:notesMasterId r:id="rId26"/>
+    <p:notesMasterId r:id="rId27"/>
   </p:notesMasterIdLst>
   <p:handoutMasterIdLst>
-    <p:handoutMasterId r:id="rId27"/>
+    <p:handoutMasterId r:id="rId28"/>
   </p:handoutMasterIdLst>
   <p:sldIdLst>
     <p:sldId id="594" r:id="rId6"/>
@@ -26,12 +26,13 @@
     <p:sldId id="619" r:id="rId17"/>
     <p:sldId id="620" r:id="rId18"/>
     <p:sldId id="280" r:id="rId19"/>
-    <p:sldId id="607" r:id="rId20"/>
-    <p:sldId id="609" r:id="rId21"/>
-    <p:sldId id="614" r:id="rId22"/>
-    <p:sldId id="613" r:id="rId23"/>
-    <p:sldId id="612" r:id="rId24"/>
-    <p:sldId id="616" r:id="rId25"/>
+    <p:sldId id="622" r:id="rId20"/>
+    <p:sldId id="607" r:id="rId21"/>
+    <p:sldId id="609" r:id="rId22"/>
+    <p:sldId id="614" r:id="rId23"/>
+    <p:sldId id="613" r:id="rId24"/>
+    <p:sldId id="612" r:id="rId25"/>
+    <p:sldId id="616" r:id="rId26"/>
   </p:sldIdLst>
   <p:sldSz cx="9144000" cy="5143500" type="screen16x9"/>
   <p:notesSz cx="6954838" cy="11984038"/>
@@ -10073,7 +10074,7 @@
           <a:p>
             <a:fld id="{7B6A12C6-64DF-430F-A4DC-0FC62ED5BE2B}" type="datetime1">
               <a:rPr lang="en-US" smtClean="0"/>
-              <a:t>10/4/2018</a:t>
+              <a:t>10/6/2018</a:t>
             </a:fld>
             <a:endParaRPr lang="en-US" dirty="0"/>
           </a:p>
@@ -10239,7 +10240,7 @@
           <a:p>
             <a:fld id="{8209028B-9E3C-481D-8F79-63DDE9F2EC79}" type="datetime1">
               <a:rPr lang="en-US" smtClean="0"/>
-              <a:t>10/4/2018</a:t>
+              <a:t>10/6/2018</a:t>
             </a:fld>
             <a:endParaRPr lang="en-US" dirty="0"/>
           </a:p>
@@ -10798,7 +10799,7 @@
           <a:p>
             <a:fld id="{64F1725A-9B26-466A-BD1F-095DBF2836CB}" type="slidenum">
               <a:rPr lang="en-US" smtClean="0"/>
-              <a:t>16</a:t>
+              <a:t>17</a:t>
             </a:fld>
             <a:endParaRPr lang="en-US"/>
           </a:p>
@@ -10882,7 +10883,7 @@
           <a:p>
             <a:fld id="{0212BA2B-C688-4DBA-9DA4-68E8380D5874}" type="slidenum">
               <a:rPr lang="en-US" smtClean="0"/>
-              <a:t>20</a:t>
+              <a:t>21</a:t>
             </a:fld>
             <a:endParaRPr lang="en-US"/>
           </a:p>
@@ -12283,7 +12284,7 @@
           <a:p>
             <a:fld id="{CB293217-2C1A-4AAE-948E-700BCDD5810A}" type="datetimeFigureOut">
               <a:rPr lang="en-US" smtClean="0"/>
-              <a:t>10/4/2018</a:t>
+              <a:t>10/6/2018</a:t>
             </a:fld>
             <a:endParaRPr lang="en-US"/>
           </a:p>
@@ -12478,7 +12479,7 @@
           <a:p>
             <a:fld id="{CB293217-2C1A-4AAE-948E-700BCDD5810A}" type="datetimeFigureOut">
               <a:rPr lang="en-US" smtClean="0"/>
-              <a:t>10/4/2018</a:t>
+              <a:t>10/6/2018</a:t>
             </a:fld>
             <a:endParaRPr lang="en-US"/>
           </a:p>
@@ -15426,6 +15427,716 @@
     <p:extLst>
       <p:ext uri="{BB962C8B-B14F-4D97-AF65-F5344CB8AC3E}">
         <p14:creationId xmlns:p14="http://schemas.microsoft.com/office/powerpoint/2010/main" val="1337715198"/>
+      </p:ext>
+    </p:extLst>
+  </p:cSld>
+  <p:clrMapOvr>
+    <a:masterClrMapping/>
+  </p:clrMapOvr>
+  <p:extLst mod="1">
+    <p:ext uri="{DCECCB84-F9BA-43D5-87BE-67443E8EF086}">
+      <p15:sldGuideLst xmlns:p15="http://schemas.microsoft.com/office/powerpoint/2012/main">
+        <p15:guide id="1" orient="horz" pos="1620">
+          <p15:clr>
+            <a:srgbClr val="FBAE40"/>
+          </p15:clr>
+        </p15:guide>
+        <p15:guide id="2" pos="2880">
+          <p15:clr>
+            <a:srgbClr val="FBAE40"/>
+          </p15:clr>
+        </p15:guide>
+      </p15:sldGuideLst>
+    </p:ext>
+  </p:extLst>
+</p:sldLayout>
+</file>
+
+<file path=ppt/slideLayouts/slideLayout25.xml><?xml version="1.0" encoding="utf-8"?>
+<p:sldLayout xmlns:a="http://schemas.openxmlformats.org/drawingml/2006/main" xmlns:r="http://schemas.openxmlformats.org/officeDocument/2006/relationships" xmlns:p="http://schemas.openxmlformats.org/presentationml/2006/main" userDrawn="1">
+  <p:cSld name="9_Generic Section Divider">
+    <p:bg bwMode="ltGray">
+      <p:bgPr>
+        <a:gradFill>
+          <a:gsLst>
+            <a:gs pos="0">
+              <a:srgbClr val="123C63"/>
+            </a:gs>
+            <a:gs pos="100000">
+              <a:srgbClr val="70808E"/>
+            </a:gs>
+          </a:gsLst>
+          <a:lin ang="0" scaled="0"/>
+        </a:gradFill>
+        <a:effectLst/>
+      </p:bgPr>
+    </p:bg>
+    <p:spTree>
+      <p:nvGrpSpPr>
+        <p:cNvPr id="1" name=""/>
+        <p:cNvGrpSpPr/>
+        <p:nvPr/>
+      </p:nvGrpSpPr>
+      <p:grpSpPr>
+        <a:xfrm>
+          <a:off x="0" y="0"/>
+          <a:ext cx="0" cy="0"/>
+          <a:chOff x="0" y="0"/>
+          <a:chExt cx="0" cy="0"/>
+        </a:xfrm>
+      </p:grpSpPr>
+      <p:sp>
+        <p:nvSpPr>
+          <p:cNvPr id="2" name="Title 1"/>
+          <p:cNvSpPr>
+            <a:spLocks noGrp="1"/>
+          </p:cNvSpPr>
+          <p:nvPr>
+            <p:ph type="ctrTitle" hasCustomPrompt="1"/>
+          </p:nvPr>
+        </p:nvSpPr>
+        <p:spPr bwMode="black">
+          <a:xfrm>
+            <a:off x="470807" y="499376"/>
+            <a:ext cx="8183720" cy="889474"/>
+          </a:xfrm>
+          <a:noFill/>
+        </p:spPr>
+        <p:txBody>
+          <a:bodyPr wrap="square" lIns="0" tIns="0" bIns="0" anchor="b" anchorCtr="0">
+            <a:spAutoFit/>
+          </a:bodyPr>
+          <a:lstStyle>
+            <a:lvl1pPr algn="l" defTabSz="914400" rtl="0" eaLnBrk="1" latinLnBrk="0" hangingPunct="1">
+              <a:lnSpc>
+                <a:spcPct val="85000"/>
+              </a:lnSpc>
+              <a:spcBef>
+                <a:spcPct val="0"/>
+              </a:spcBef>
+              <a:buNone/>
+              <a:defRPr lang="en-US" sz="3400" b="1" kern="1200" spc="-50" baseline="0" dirty="0">
+                <a:gradFill>
+                  <a:gsLst>
+                    <a:gs pos="1000">
+                      <a:schemeClr val="bg1"/>
+                    </a:gs>
+                    <a:gs pos="99000">
+                      <a:schemeClr val="bg1"/>
+                    </a:gs>
+                  </a:gsLst>
+                  <a:lin ang="13200000" scaled="0"/>
+                </a:gradFill>
+                <a:latin typeface="Arial" panose="020B0604020202020204" pitchFamily="34" charset="0"/>
+                <a:ea typeface="+mj-ea"/>
+                <a:cs typeface="Arial" panose="020B0604020202020204" pitchFamily="34" charset="0"/>
+              </a:defRPr>
+            </a:lvl1pPr>
+          </a:lstStyle>
+          <a:p>
+            <a:r>
+              <a:rPr lang="en-US" dirty="0"/>
+              <a:t>Click to edit </a:t>
+            </a:r>
+            <a:br>
+              <a:rPr lang="en-US" dirty="0"/>
+            </a:br>
+            <a:r>
+              <a:rPr lang="en-US" dirty="0"/>
+              <a:t>master title style</a:t>
+            </a:r>
+          </a:p>
+        </p:txBody>
+      </p:sp>
+      <p:sp>
+        <p:nvSpPr>
+          <p:cNvPr id="10" name="Subtitle 2"/>
+          <p:cNvSpPr>
+            <a:spLocks noGrp="1"/>
+          </p:cNvSpPr>
+          <p:nvPr>
+            <p:ph type="subTitle" idx="1" hasCustomPrompt="1"/>
+          </p:nvPr>
+        </p:nvSpPr>
+        <p:spPr>
+          <a:xfrm>
+            <a:off x="476186" y="1510897"/>
+            <a:ext cx="5655737" cy="261610"/>
+          </a:xfrm>
+          <a:prstGeom prst="rect">
+            <a:avLst/>
+          </a:prstGeom>
+        </p:spPr>
+        <p:txBody>
+          <a:bodyPr/>
+          <a:lstStyle>
+            <a:lvl1pPr marL="0" indent="0" algn="l" defTabSz="914400" rtl="0" eaLnBrk="1" latinLnBrk="0" hangingPunct="1">
+              <a:lnSpc>
+                <a:spcPct val="100000"/>
+              </a:lnSpc>
+              <a:spcBef>
+                <a:spcPct val="0"/>
+              </a:spcBef>
+              <a:buClr>
+                <a:srgbClr val="00B7E6"/>
+              </a:buClr>
+              <a:buSzPct val="110000"/>
+              <a:buFont typeface="Wingdings" panose="05000000000000000000" pitchFamily="2" charset="2"/>
+              <a:buNone/>
+              <a:defRPr lang="en-US" sz="1100" b="1" kern="1200" spc="0" baseline="0" dirty="0">
+                <a:gradFill>
+                  <a:gsLst>
+                    <a:gs pos="12389">
+                      <a:schemeClr val="bg1"/>
+                    </a:gs>
+                    <a:gs pos="34000">
+                      <a:schemeClr val="bg1"/>
+                    </a:gs>
+                  </a:gsLst>
+                  <a:lin ang="5400000" scaled="0"/>
+                </a:gradFill>
+                <a:latin typeface="Arial" panose="020B0604020202020204" pitchFamily="34" charset="0"/>
+                <a:ea typeface="+mj-ea"/>
+                <a:cs typeface="Arial" panose="020B0604020202020204" pitchFamily="34" charset="0"/>
+              </a:defRPr>
+            </a:lvl1pPr>
+            <a:lvl2pPr marL="457200" indent="0" algn="ctr">
+              <a:buNone/>
+              <a:defRPr>
+                <a:solidFill>
+                  <a:schemeClr val="tx1">
+                    <a:tint val="75000"/>
+                  </a:schemeClr>
+                </a:solidFill>
+              </a:defRPr>
+            </a:lvl2pPr>
+            <a:lvl3pPr marL="914400" indent="0" algn="ctr">
+              <a:buNone/>
+              <a:defRPr>
+                <a:solidFill>
+                  <a:schemeClr val="tx1">
+                    <a:tint val="75000"/>
+                  </a:schemeClr>
+                </a:solidFill>
+              </a:defRPr>
+            </a:lvl3pPr>
+            <a:lvl4pPr marL="1371600" indent="0" algn="ctr">
+              <a:buNone/>
+              <a:defRPr>
+                <a:solidFill>
+                  <a:schemeClr val="tx1">
+                    <a:tint val="75000"/>
+                  </a:schemeClr>
+                </a:solidFill>
+              </a:defRPr>
+            </a:lvl4pPr>
+            <a:lvl5pPr marL="1828800" indent="0" algn="ctr">
+              <a:buNone/>
+              <a:defRPr>
+                <a:solidFill>
+                  <a:schemeClr val="tx1">
+                    <a:tint val="75000"/>
+                  </a:schemeClr>
+                </a:solidFill>
+              </a:defRPr>
+            </a:lvl5pPr>
+            <a:lvl6pPr marL="2286000" indent="0" algn="ctr">
+              <a:buNone/>
+              <a:defRPr>
+                <a:solidFill>
+                  <a:schemeClr val="tx1">
+                    <a:tint val="75000"/>
+                  </a:schemeClr>
+                </a:solidFill>
+              </a:defRPr>
+            </a:lvl6pPr>
+            <a:lvl7pPr marL="2743200" indent="0" algn="ctr">
+              <a:buNone/>
+              <a:defRPr>
+                <a:solidFill>
+                  <a:schemeClr val="tx1">
+                    <a:tint val="75000"/>
+                  </a:schemeClr>
+                </a:solidFill>
+              </a:defRPr>
+            </a:lvl7pPr>
+            <a:lvl8pPr marL="3200400" indent="0" algn="ctr">
+              <a:buNone/>
+              <a:defRPr>
+                <a:solidFill>
+                  <a:schemeClr val="tx1">
+                    <a:tint val="75000"/>
+                  </a:schemeClr>
+                </a:solidFill>
+              </a:defRPr>
+            </a:lvl8pPr>
+            <a:lvl9pPr marL="3657600" indent="0" algn="ctr">
+              <a:buNone/>
+              <a:defRPr>
+                <a:solidFill>
+                  <a:schemeClr val="tx1">
+                    <a:tint val="75000"/>
+                  </a:schemeClr>
+                </a:solidFill>
+              </a:defRPr>
+            </a:lvl9pPr>
+          </a:lstStyle>
+          <a:p>
+            <a:r>
+              <a:rPr lang="en-US" dirty="0"/>
+              <a:t>CLICK TO EDIT MASTER SUBTITLE STYLE</a:t>
+            </a:r>
+          </a:p>
+        </p:txBody>
+      </p:sp>
+      <p:sp>
+        <p:nvSpPr>
+          <p:cNvPr id="4" name="Text Placeholder 3"/>
+          <p:cNvSpPr>
+            <a:spLocks noGrp="1"/>
+          </p:cNvSpPr>
+          <p:nvPr>
+            <p:ph type="body" sz="quarter" idx="10"/>
+          </p:nvPr>
+        </p:nvSpPr>
+        <p:spPr>
+          <a:xfrm>
+            <a:off x="476186" y="1726941"/>
+            <a:ext cx="5652808" cy="230832"/>
+          </a:xfrm>
+        </p:spPr>
+        <p:txBody>
+          <a:bodyPr vert="horz" wrap="square" lIns="0" tIns="45720" rIns="0" bIns="45720" rtlCol="0">
+            <a:spAutoFit/>
+          </a:bodyPr>
+          <a:lstStyle>
+            <a:lvl1pPr marL="173038" indent="-173038">
+              <a:buNone/>
+              <a:defRPr lang="en-US" sz="900" b="0" i="1" kern="1200" spc="80" baseline="0" dirty="0" smtClean="0">
+                <a:gradFill>
+                  <a:gsLst>
+                    <a:gs pos="12389">
+                      <a:schemeClr val="bg1"/>
+                    </a:gs>
+                    <a:gs pos="34000">
+                      <a:schemeClr val="bg1"/>
+                    </a:gs>
+                  </a:gsLst>
+                  <a:lin ang="5400000" scaled="0"/>
+                </a:gradFill>
+                <a:latin typeface="Georgia" panose="02040502050405020303" pitchFamily="18" charset="0"/>
+                <a:ea typeface="+mj-ea"/>
+                <a:cs typeface="Arial" panose="020B0604020202020204" pitchFamily="34" charset="0"/>
+              </a:defRPr>
+            </a:lvl1pPr>
+            <a:lvl2pPr>
+              <a:defRPr lang="en-US" sz="1200" b="0" kern="1200" spc="0" baseline="0" dirty="0" smtClean="0">
+                <a:gradFill>
+                  <a:gsLst>
+                    <a:gs pos="12389">
+                      <a:schemeClr val="bg1"/>
+                    </a:gs>
+                    <a:gs pos="34000">
+                      <a:schemeClr val="bg1"/>
+                    </a:gs>
+                  </a:gsLst>
+                  <a:lin ang="5400000" scaled="0"/>
+                </a:gradFill>
+                <a:latin typeface="Arial" panose="020B0604020202020204" pitchFamily="34" charset="0"/>
+                <a:ea typeface="+mj-ea"/>
+                <a:cs typeface="Arial" panose="020B0604020202020204" pitchFamily="34" charset="0"/>
+              </a:defRPr>
+            </a:lvl2pPr>
+            <a:lvl3pPr>
+              <a:defRPr lang="en-US" sz="1200" b="0" kern="1200" spc="0" baseline="0" dirty="0" smtClean="0">
+                <a:gradFill>
+                  <a:gsLst>
+                    <a:gs pos="12389">
+                      <a:schemeClr val="bg1"/>
+                    </a:gs>
+                    <a:gs pos="34000">
+                      <a:schemeClr val="bg1"/>
+                    </a:gs>
+                  </a:gsLst>
+                  <a:lin ang="5400000" scaled="0"/>
+                </a:gradFill>
+                <a:latin typeface="Arial" panose="020B0604020202020204" pitchFamily="34" charset="0"/>
+                <a:ea typeface="+mj-ea"/>
+                <a:cs typeface="Arial" panose="020B0604020202020204" pitchFamily="34" charset="0"/>
+              </a:defRPr>
+            </a:lvl3pPr>
+            <a:lvl4pPr>
+              <a:defRPr lang="en-US" sz="1200" b="0" kern="1200" spc="0" baseline="0" dirty="0" smtClean="0">
+                <a:gradFill>
+                  <a:gsLst>
+                    <a:gs pos="12389">
+                      <a:schemeClr val="bg1"/>
+                    </a:gs>
+                    <a:gs pos="34000">
+                      <a:schemeClr val="bg1"/>
+                    </a:gs>
+                  </a:gsLst>
+                  <a:lin ang="5400000" scaled="0"/>
+                </a:gradFill>
+                <a:latin typeface="Arial" panose="020B0604020202020204" pitchFamily="34" charset="0"/>
+                <a:ea typeface="+mj-ea"/>
+                <a:cs typeface="Arial" panose="020B0604020202020204" pitchFamily="34" charset="0"/>
+              </a:defRPr>
+            </a:lvl4pPr>
+            <a:lvl5pPr>
+              <a:defRPr lang="en-US" sz="1200" b="0" kern="1200" spc="0" baseline="0" dirty="0" smtClean="0">
+                <a:gradFill>
+                  <a:gsLst>
+                    <a:gs pos="12389">
+                      <a:schemeClr val="bg1"/>
+                    </a:gs>
+                    <a:gs pos="34000">
+                      <a:schemeClr val="bg1"/>
+                    </a:gs>
+                  </a:gsLst>
+                  <a:lin ang="5400000" scaled="0"/>
+                </a:gradFill>
+                <a:latin typeface="Arial" panose="020B0604020202020204" pitchFamily="34" charset="0"/>
+                <a:ea typeface="+mj-ea"/>
+                <a:cs typeface="Arial" panose="020B0604020202020204" pitchFamily="34" charset="0"/>
+              </a:defRPr>
+            </a:lvl5pPr>
+          </a:lstStyle>
+          <a:p>
+            <a:pPr marL="0" lvl="0" indent="0">
+              <a:lnSpc>
+                <a:spcPct val="100000"/>
+              </a:lnSpc>
+              <a:spcBef>
+                <a:spcPct val="0"/>
+              </a:spcBef>
+            </a:pPr>
+            <a:r>
+              <a:rPr lang="en-US"/>
+              <a:t>Edit Master text styles</a:t>
+            </a:r>
+          </a:p>
+        </p:txBody>
+      </p:sp>
+      <p:pic>
+        <p:nvPicPr>
+          <p:cNvPr id="13" name="Picture 12"/>
+          <p:cNvPicPr>
+            <a:picLocks noChangeAspect="1"/>
+          </p:cNvPicPr>
+          <p:nvPr userDrawn="1"/>
+        </p:nvPicPr>
+        <p:blipFill>
+          <a:blip r:embed="rId2" cstate="print">
+            <a:extLst>
+              <a:ext uri="{28A0092B-C50C-407E-A947-70E740481C1C}">
+                <a14:useLocalDpi xmlns:a14="http://schemas.microsoft.com/office/drawing/2010/main" val="0"/>
+              </a:ext>
+            </a:extLst>
+          </a:blip>
+          <a:stretch>
+            <a:fillRect/>
+          </a:stretch>
+        </p:blipFill>
+        <p:spPr>
+          <a:xfrm>
+            <a:off x="8105140" y="4700244"/>
+            <a:ext cx="804579" cy="209688"/>
+          </a:xfrm>
+          <a:prstGeom prst="rect">
+            <a:avLst/>
+          </a:prstGeom>
+        </p:spPr>
+      </p:pic>
+      <p:grpSp>
+        <p:nvGrpSpPr>
+          <p:cNvPr id="8" name="RGB Color Values" hidden="1"/>
+          <p:cNvGrpSpPr/>
+          <p:nvPr userDrawn="1"/>
+        </p:nvGrpSpPr>
+        <p:grpSpPr>
+          <a:xfrm>
+            <a:off x="0" y="-1143000"/>
+            <a:ext cx="9144000" cy="7150100"/>
+            <a:chOff x="0" y="-1143000"/>
+            <a:chExt cx="9144000" cy="7150100"/>
+          </a:xfrm>
+        </p:grpSpPr>
+        <p:pic>
+          <p:nvPicPr>
+            <p:cNvPr id="3" name="Picture 2"/>
+            <p:cNvPicPr>
+              <a:picLocks noChangeAspect="1"/>
+            </p:cNvPicPr>
+            <p:nvPr userDrawn="1"/>
+          </p:nvPicPr>
+          <p:blipFill>
+            <a:blip r:embed="rId3">
+              <a:extLst>
+                <a:ext uri="{28A0092B-C50C-407E-A947-70E740481C1C}">
+                  <a14:useLocalDpi xmlns:a14="http://schemas.microsoft.com/office/drawing/2010/main" val="0"/>
+                </a:ext>
+              </a:extLst>
+            </a:blip>
+            <a:stretch>
+              <a:fillRect/>
+            </a:stretch>
+          </p:blipFill>
+          <p:spPr>
+            <a:xfrm>
+              <a:off x="0" y="-1143000"/>
+              <a:ext cx="409575" cy="876300"/>
+            </a:xfrm>
+            <a:prstGeom prst="rect">
+              <a:avLst/>
+            </a:prstGeom>
+          </p:spPr>
+        </p:pic>
+        <p:pic>
+          <p:nvPicPr>
+            <p:cNvPr id="5" name="Picture 4"/>
+            <p:cNvPicPr>
+              <a:picLocks noChangeAspect="1"/>
+            </p:cNvPicPr>
+            <p:nvPr userDrawn="1"/>
+          </p:nvPicPr>
+          <p:blipFill>
+            <a:blip r:embed="rId4">
+              <a:extLst>
+                <a:ext uri="{28A0092B-C50C-407E-A947-70E740481C1C}">
+                  <a14:useLocalDpi xmlns:a14="http://schemas.microsoft.com/office/drawing/2010/main" val="0"/>
+                </a:ext>
+              </a:extLst>
+            </a:blip>
+            <a:stretch>
+              <a:fillRect/>
+            </a:stretch>
+          </p:blipFill>
+          <p:spPr>
+            <a:xfrm>
+              <a:off x="4348162" y="-1143000"/>
+              <a:ext cx="447675" cy="942975"/>
+            </a:xfrm>
+            <a:prstGeom prst="rect">
+              <a:avLst/>
+            </a:prstGeom>
+          </p:spPr>
+        </p:pic>
+        <p:pic>
+          <p:nvPicPr>
+            <p:cNvPr id="6" name="Picture 5"/>
+            <p:cNvPicPr>
+              <a:picLocks noChangeAspect="1"/>
+            </p:cNvPicPr>
+            <p:nvPr userDrawn="1"/>
+          </p:nvPicPr>
+          <p:blipFill>
+            <a:blip r:embed="rId5">
+              <a:extLst>
+                <a:ext uri="{28A0092B-C50C-407E-A947-70E740481C1C}">
+                  <a14:useLocalDpi xmlns:a14="http://schemas.microsoft.com/office/drawing/2010/main" val="0"/>
+                </a:ext>
+              </a:extLst>
+            </a:blip>
+            <a:stretch>
+              <a:fillRect/>
+            </a:stretch>
+          </p:blipFill>
+          <p:spPr>
+            <a:xfrm>
+              <a:off x="8782050" y="-1123950"/>
+              <a:ext cx="361950" cy="923925"/>
+            </a:xfrm>
+            <a:prstGeom prst="rect">
+              <a:avLst/>
+            </a:prstGeom>
+          </p:spPr>
+        </p:pic>
+        <p:pic>
+          <p:nvPicPr>
+            <p:cNvPr id="7" name="Picture 6"/>
+            <p:cNvPicPr>
+              <a:picLocks noChangeAspect="1"/>
+            </p:cNvPicPr>
+            <p:nvPr userDrawn="1"/>
+          </p:nvPicPr>
+          <p:blipFill>
+            <a:blip r:embed="rId6">
+              <a:extLst>
+                <a:ext uri="{28A0092B-C50C-407E-A947-70E740481C1C}">
+                  <a14:useLocalDpi xmlns:a14="http://schemas.microsoft.com/office/drawing/2010/main" val="0"/>
+                </a:ext>
+              </a:extLst>
+            </a:blip>
+            <a:stretch>
+              <a:fillRect/>
+            </a:stretch>
+          </p:blipFill>
+          <p:spPr>
+            <a:xfrm>
+              <a:off x="3467099" y="5511800"/>
+              <a:ext cx="2047875" cy="495300"/>
+            </a:xfrm>
+            <a:prstGeom prst="rect">
+              <a:avLst/>
+            </a:prstGeom>
+          </p:spPr>
+        </p:pic>
+      </p:grpSp>
+      <p:grpSp>
+        <p:nvGrpSpPr>
+          <p:cNvPr id="12" name="Group 11" hidden="1"/>
+          <p:cNvGrpSpPr/>
+          <p:nvPr userDrawn="1"/>
+        </p:nvGrpSpPr>
+        <p:grpSpPr>
+          <a:xfrm>
+            <a:off x="9461" y="-1143000"/>
+            <a:ext cx="9134539" cy="962025"/>
+            <a:chOff x="9461" y="-1143000"/>
+            <a:chExt cx="9134539" cy="962025"/>
+          </a:xfrm>
+        </p:grpSpPr>
+        <p:pic>
+          <p:nvPicPr>
+            <p:cNvPr id="9" name="Picture 8"/>
+            <p:cNvPicPr>
+              <a:picLocks noChangeAspect="1"/>
+            </p:cNvPicPr>
+            <p:nvPr userDrawn="1"/>
+          </p:nvPicPr>
+          <p:blipFill>
+            <a:blip r:embed="rId7">
+              <a:extLst>
+                <a:ext uri="{28A0092B-C50C-407E-A947-70E740481C1C}">
+                  <a14:useLocalDpi xmlns:a14="http://schemas.microsoft.com/office/drawing/2010/main" val="0"/>
+                </a:ext>
+              </a:extLst>
+            </a:blip>
+            <a:stretch>
+              <a:fillRect/>
+            </a:stretch>
+          </p:blipFill>
+          <p:spPr>
+            <a:xfrm>
+              <a:off x="9461" y="-1143000"/>
+              <a:ext cx="466725" cy="962025"/>
+            </a:xfrm>
+            <a:prstGeom prst="rect">
+              <a:avLst/>
+            </a:prstGeom>
+          </p:spPr>
+        </p:pic>
+        <p:pic>
+          <p:nvPicPr>
+            <p:cNvPr id="11" name="Picture 10"/>
+            <p:cNvPicPr>
+              <a:picLocks noChangeAspect="1"/>
+            </p:cNvPicPr>
+            <p:nvPr userDrawn="1"/>
+          </p:nvPicPr>
+          <p:blipFill>
+            <a:blip r:embed="rId8">
+              <a:extLst>
+                <a:ext uri="{28A0092B-C50C-407E-A947-70E740481C1C}">
+                  <a14:useLocalDpi xmlns:a14="http://schemas.microsoft.com/office/drawing/2010/main" val="0"/>
+                </a:ext>
+              </a:extLst>
+            </a:blip>
+            <a:stretch>
+              <a:fillRect/>
+            </a:stretch>
+          </p:blipFill>
+          <p:spPr>
+            <a:xfrm>
+              <a:off x="8667750" y="-1095375"/>
+              <a:ext cx="476250" cy="914400"/>
+            </a:xfrm>
+            <a:prstGeom prst="rect">
+              <a:avLst/>
+            </a:prstGeom>
+          </p:spPr>
+        </p:pic>
+      </p:grpSp>
+      <p:grpSp>
+        <p:nvGrpSpPr>
+          <p:cNvPr id="16" name="Group 15" hidden="1"/>
+          <p:cNvGrpSpPr/>
+          <p:nvPr userDrawn="1"/>
+        </p:nvGrpSpPr>
+        <p:grpSpPr>
+          <a:xfrm>
+            <a:off x="-28575" y="-1143000"/>
+            <a:ext cx="9172575" cy="933450"/>
+            <a:chOff x="-28575" y="-1143000"/>
+            <a:chExt cx="9172575" cy="933450"/>
+          </a:xfrm>
+        </p:grpSpPr>
+        <p:pic>
+          <p:nvPicPr>
+            <p:cNvPr id="14" name="Picture 13"/>
+            <p:cNvPicPr>
+              <a:picLocks noChangeAspect="1"/>
+            </p:cNvPicPr>
+            <p:nvPr userDrawn="1"/>
+          </p:nvPicPr>
+          <p:blipFill>
+            <a:blip r:embed="rId9">
+              <a:extLst>
+                <a:ext uri="{28A0092B-C50C-407E-A947-70E740481C1C}">
+                  <a14:useLocalDpi xmlns:a14="http://schemas.microsoft.com/office/drawing/2010/main" val="0"/>
+                </a:ext>
+              </a:extLst>
+            </a:blip>
+            <a:stretch>
+              <a:fillRect/>
+            </a:stretch>
+          </p:blipFill>
+          <p:spPr>
+            <a:xfrm>
+              <a:off x="-28575" y="-1143000"/>
+              <a:ext cx="438150" cy="933450"/>
+            </a:xfrm>
+            <a:prstGeom prst="rect">
+              <a:avLst/>
+            </a:prstGeom>
+          </p:spPr>
+        </p:pic>
+        <p:pic>
+          <p:nvPicPr>
+            <p:cNvPr id="15" name="Picture 14"/>
+            <p:cNvPicPr>
+              <a:picLocks noChangeAspect="1"/>
+            </p:cNvPicPr>
+            <p:nvPr userDrawn="1"/>
+          </p:nvPicPr>
+          <p:blipFill>
+            <a:blip r:embed="rId10">
+              <a:extLst>
+                <a:ext uri="{28A0092B-C50C-407E-A947-70E740481C1C}">
+                  <a14:useLocalDpi xmlns:a14="http://schemas.microsoft.com/office/drawing/2010/main" val="0"/>
+                </a:ext>
+              </a:extLst>
+            </a:blip>
+            <a:stretch>
+              <a:fillRect/>
+            </a:stretch>
+          </p:blipFill>
+          <p:spPr>
+            <a:xfrm>
+              <a:off x="8715375" y="-1114425"/>
+              <a:ext cx="428625" cy="904875"/>
+            </a:xfrm>
+            <a:prstGeom prst="rect">
+              <a:avLst/>
+            </a:prstGeom>
+          </p:spPr>
+        </p:pic>
+      </p:grpSp>
+    </p:spTree>
+    <p:extLst>
+      <p:ext uri="{BB962C8B-B14F-4D97-AF65-F5344CB8AC3E}">
+        <p14:creationId xmlns:p14="http://schemas.microsoft.com/office/powerpoint/2010/main" val="1634390990"/>
       </p:ext>
     </p:extLst>
   </p:cSld>
@@ -18681,6 +19392,7 @@
     <p:sldLayoutId id="2147483860" r:id="rId10"/>
     <p:sldLayoutId id="2147483861" r:id="rId11"/>
     <p:sldLayoutId id="2147483862" r:id="rId12"/>
+    <p:sldLayoutId id="2147483863" r:id="rId13"/>
   </p:sldLayoutIdLst>
   <p:hf hdr="0" ftr="0" dt="0"/>
   <p:txStyles>
@@ -20340,6 +21052,157 @@
       </p:grpSpPr>
       <p:sp>
         <p:nvSpPr>
+          <p:cNvPr id="5" name="Title 4">
+            <a:extLst>
+              <a:ext uri="{FF2B5EF4-FFF2-40B4-BE49-F238E27FC236}">
+                <a16:creationId xmlns:a16="http://schemas.microsoft.com/office/drawing/2014/main" id="{990D9B58-51E4-4511-B240-C21B65D53300}"/>
+              </a:ext>
+            </a:extLst>
+          </p:cNvPr>
+          <p:cNvSpPr>
+            <a:spLocks noGrp="1"/>
+          </p:cNvSpPr>
+          <p:nvPr>
+            <p:ph type="ctrTitle"/>
+          </p:nvPr>
+        </p:nvSpPr>
+        <p:spPr>
+          <a:xfrm>
+            <a:off x="470807" y="944113"/>
+            <a:ext cx="8183720" cy="444737"/>
+          </a:xfrm>
+        </p:spPr>
+        <p:txBody>
+          <a:bodyPr/>
+          <a:lstStyle/>
+          <a:p>
+            <a:r>
+              <a:rPr lang="en-US" dirty="0"/>
+              <a:t>Demo</a:t>
+            </a:r>
+          </a:p>
+        </p:txBody>
+      </p:sp>
+      <p:sp>
+        <p:nvSpPr>
+          <p:cNvPr id="6" name="Subtitle 5">
+            <a:extLst>
+              <a:ext uri="{FF2B5EF4-FFF2-40B4-BE49-F238E27FC236}">
+                <a16:creationId xmlns:a16="http://schemas.microsoft.com/office/drawing/2014/main" id="{89E552BC-C578-43DB-A159-B21D078ACA7D}"/>
+              </a:ext>
+            </a:extLst>
+          </p:cNvPr>
+          <p:cNvSpPr>
+            <a:spLocks noGrp="1"/>
+          </p:cNvSpPr>
+          <p:nvPr>
+            <p:ph type="subTitle" idx="1"/>
+          </p:nvPr>
+        </p:nvSpPr>
+        <p:spPr/>
+        <p:txBody>
+          <a:bodyPr/>
+          <a:lstStyle/>
+          <a:p>
+            <a:r>
+              <a:rPr lang="en-US" dirty="0"/>
+              <a:t>Monitoring and tuning – EF Core</a:t>
+            </a:r>
+          </a:p>
+        </p:txBody>
+      </p:sp>
+      <p:sp>
+        <p:nvSpPr>
+          <p:cNvPr id="7" name="Text Placeholder 6">
+            <a:extLst>
+              <a:ext uri="{FF2B5EF4-FFF2-40B4-BE49-F238E27FC236}">
+                <a16:creationId xmlns:a16="http://schemas.microsoft.com/office/drawing/2014/main" id="{EEE0BD1D-5B60-4B5B-8BF3-F8E463E2A7D5}"/>
+              </a:ext>
+            </a:extLst>
+          </p:cNvPr>
+          <p:cNvSpPr>
+            <a:spLocks noGrp="1"/>
+          </p:cNvSpPr>
+          <p:nvPr>
+            <p:ph type="body" sz="quarter" idx="10"/>
+          </p:nvPr>
+        </p:nvSpPr>
+        <p:spPr/>
+        <p:txBody>
+          <a:bodyPr/>
+          <a:lstStyle/>
+          <a:p>
+            <a:endParaRPr lang="en-US" dirty="0"/>
+          </a:p>
+        </p:txBody>
+      </p:sp>
+      <p:sp>
+        <p:nvSpPr>
+          <p:cNvPr id="4" name="Slide Number Placeholder 3">
+            <a:extLst>
+              <a:ext uri="{FF2B5EF4-FFF2-40B4-BE49-F238E27FC236}">
+                <a16:creationId xmlns:a16="http://schemas.microsoft.com/office/drawing/2014/main" id="{4F4FBC87-4875-465E-BE2B-683F4A9B9A17}"/>
+              </a:ext>
+            </a:extLst>
+          </p:cNvPr>
+          <p:cNvSpPr>
+            <a:spLocks noGrp="1"/>
+          </p:cNvSpPr>
+          <p:nvPr>
+            <p:ph type="sldNum" sz="quarter" idx="4294967295"/>
+          </p:nvPr>
+        </p:nvSpPr>
+        <p:spPr>
+          <a:xfrm>
+            <a:off x="7086600" y="4767263"/>
+            <a:ext cx="2057400" cy="274637"/>
+          </a:xfrm>
+        </p:spPr>
+        <p:txBody>
+          <a:bodyPr/>
+          <a:lstStyle/>
+          <a:p>
+            <a:fld id="{4CA37C95-3A7F-4C90-9D28-0B573484ACDD}" type="slidenum">
+              <a:rPr lang="en-US" smtClean="0"/>
+              <a:pPr/>
+              <a:t>15</a:t>
+            </a:fld>
+            <a:endParaRPr lang="en-US"/>
+          </a:p>
+        </p:txBody>
+      </p:sp>
+    </p:spTree>
+    <p:extLst>
+      <p:ext uri="{BB962C8B-B14F-4D97-AF65-F5344CB8AC3E}">
+        <p14:creationId xmlns:p14="http://schemas.microsoft.com/office/powerpoint/2010/main" val="3870416405"/>
+      </p:ext>
+    </p:extLst>
+  </p:cSld>
+  <p:clrMapOvr>
+    <a:masterClrMapping/>
+  </p:clrMapOvr>
+</p:sld>
+</file>
+
+<file path=ppt/slides/slide16.xml><?xml version="1.0" encoding="utf-8"?>
+<p:sld xmlns:a="http://schemas.openxmlformats.org/drawingml/2006/main" xmlns:r="http://schemas.openxmlformats.org/officeDocument/2006/relationships" xmlns:p="http://schemas.openxmlformats.org/presentationml/2006/main">
+  <p:cSld>
+    <p:spTree>
+      <p:nvGrpSpPr>
+        <p:cNvPr id="1" name=""/>
+        <p:cNvGrpSpPr/>
+        <p:nvPr/>
+      </p:nvGrpSpPr>
+      <p:grpSpPr>
+        <a:xfrm>
+          <a:off x="0" y="0"/>
+          <a:ext cx="0" cy="0"/>
+          <a:chOff x="0" y="0"/>
+          <a:chExt cx="0" cy="0"/>
+        </a:xfrm>
+      </p:grpSpPr>
+      <p:sp>
+        <p:nvSpPr>
           <p:cNvPr id="2" name="Title 1"/>
           <p:cNvSpPr>
             <a:spLocks noGrp="1"/>
@@ -20443,7 +21306,7 @@
 </p:sld>
 </file>
 
-<file path=ppt/slides/slide16.xml><?xml version="1.0" encoding="utf-8"?>
+<file path=ppt/slides/slide17.xml><?xml version="1.0" encoding="utf-8"?>
 <p:sld xmlns:a="http://schemas.openxmlformats.org/drawingml/2006/main" xmlns:r="http://schemas.openxmlformats.org/officeDocument/2006/relationships" xmlns:p="http://schemas.openxmlformats.org/presentationml/2006/main">
   <p:cSld>
     <p:spTree>
@@ -20557,7 +21420,7 @@
 </p:sld>
 </file>
 
-<file path=ppt/slides/slide17.xml><?xml version="1.0" encoding="utf-8"?>
+<file path=ppt/slides/slide18.xml><?xml version="1.0" encoding="utf-8"?>
 <p:sld xmlns:a="http://schemas.openxmlformats.org/drawingml/2006/main" xmlns:r="http://schemas.openxmlformats.org/officeDocument/2006/relationships" xmlns:p="http://schemas.openxmlformats.org/presentationml/2006/main" show="0">
   <p:cSld>
     <p:spTree>
@@ -20802,7 +21665,7 @@
 </p:sld>
 </file>
 
-<file path=ppt/slides/slide18.xml><?xml version="1.0" encoding="utf-8"?>
+<file path=ppt/slides/slide19.xml><?xml version="1.0" encoding="utf-8"?>
 <p:sld xmlns:a="http://schemas.openxmlformats.org/drawingml/2006/main" xmlns:r="http://schemas.openxmlformats.org/officeDocument/2006/relationships" xmlns:p="http://schemas.openxmlformats.org/presentationml/2006/main">
   <p:cSld>
     <p:spTree>
@@ -20924,7 +21787,107 @@
 </p:sld>
 </file>
 
-<file path=ppt/slides/slide19.xml><?xml version="1.0" encoding="utf-8"?>
+<file path=ppt/slides/slide2.xml><?xml version="1.0" encoding="utf-8"?>
+<p:sld xmlns:a="http://schemas.openxmlformats.org/drawingml/2006/main" xmlns:r="http://schemas.openxmlformats.org/officeDocument/2006/relationships" xmlns:p="http://schemas.openxmlformats.org/presentationml/2006/main">
+  <p:cSld>
+    <p:spTree>
+      <p:nvGrpSpPr>
+        <p:cNvPr id="1" name=""/>
+        <p:cNvGrpSpPr/>
+        <p:nvPr/>
+      </p:nvGrpSpPr>
+      <p:grpSpPr>
+        <a:xfrm>
+          <a:off x="0" y="0"/>
+          <a:ext cx="0" cy="0"/>
+          <a:chOff x="0" y="0"/>
+          <a:chExt cx="0" cy="0"/>
+        </a:xfrm>
+      </p:grpSpPr>
+      <p:sp>
+        <p:nvSpPr>
+          <p:cNvPr id="4" name="Title 3"/>
+          <p:cNvSpPr>
+            <a:spLocks noGrp="1"/>
+          </p:cNvSpPr>
+          <p:nvPr>
+            <p:ph type="title"/>
+          </p:nvPr>
+        </p:nvSpPr>
+        <p:spPr/>
+        <p:txBody>
+          <a:bodyPr/>
+          <a:lstStyle/>
+          <a:p>
+            <a:r>
+              <a:rPr lang="en-US" dirty="0"/>
+              <a:t>Demo Data Model</a:t>
+            </a:r>
+          </a:p>
+        </p:txBody>
+      </p:sp>
+      <p:sp>
+        <p:nvSpPr>
+          <p:cNvPr id="2" name="Slide Number Placeholder 1"/>
+          <p:cNvSpPr>
+            <a:spLocks noGrp="1"/>
+          </p:cNvSpPr>
+          <p:nvPr>
+            <p:ph type="sldNum" sz="quarter" idx="12"/>
+          </p:nvPr>
+        </p:nvSpPr>
+        <p:spPr/>
+        <p:txBody>
+          <a:bodyPr/>
+          <a:lstStyle/>
+          <a:p>
+            <a:fld id="{4CA37C95-3A7F-4C90-9D28-0B573484ACDD}" type="slidenum">
+              <a:rPr lang="en-US" smtClean="0"/>
+              <a:pPr/>
+              <a:t>2</a:t>
+            </a:fld>
+            <a:endParaRPr lang="en-US"/>
+          </a:p>
+        </p:txBody>
+      </p:sp>
+      <p:pic>
+        <p:nvPicPr>
+          <p:cNvPr id="5" name="Picture 4"/>
+          <p:cNvPicPr>
+            <a:picLocks noChangeAspect="1"/>
+          </p:cNvPicPr>
+          <p:nvPr/>
+        </p:nvPicPr>
+        <p:blipFill>
+          <a:blip r:embed="rId2"/>
+          <a:stretch>
+            <a:fillRect/>
+          </a:stretch>
+        </p:blipFill>
+        <p:spPr>
+          <a:xfrm>
+            <a:off x="1563519" y="963675"/>
+            <a:ext cx="6218609" cy="3955773"/>
+          </a:xfrm>
+          <a:prstGeom prst="rect">
+            <a:avLst/>
+          </a:prstGeom>
+        </p:spPr>
+      </p:pic>
+    </p:spTree>
+    <p:extLst>
+      <p:ext uri="{BB962C8B-B14F-4D97-AF65-F5344CB8AC3E}">
+        <p14:creationId xmlns:p14="http://schemas.microsoft.com/office/powerpoint/2010/main" val="2976220986"/>
+      </p:ext>
+    </p:extLst>
+  </p:cSld>
+  <p:clrMapOvr>
+    <a:masterClrMapping/>
+  </p:clrMapOvr>
+</p:sld>
+</file>
+
+<file path=ppt/slides/slide20.xml><?xml version="1.0" encoding="utf-8"?>
 <p:sld xmlns:a="http://schemas.openxmlformats.org/drawingml/2006/main" xmlns:r="http://schemas.openxmlformats.org/officeDocument/2006/relationships" xmlns:p="http://schemas.openxmlformats.org/presentationml/2006/main">
   <p:cSld>
     <p:spTree>
@@ -21307,107 +22270,7 @@
 </p:sld>
 </file>
 
-<file path=ppt/slides/slide2.xml><?xml version="1.0" encoding="utf-8"?>
-<p:sld xmlns:a="http://schemas.openxmlformats.org/drawingml/2006/main" xmlns:r="http://schemas.openxmlformats.org/officeDocument/2006/relationships" xmlns:p="http://schemas.openxmlformats.org/presentationml/2006/main">
-  <p:cSld>
-    <p:spTree>
-      <p:nvGrpSpPr>
-        <p:cNvPr id="1" name=""/>
-        <p:cNvGrpSpPr/>
-        <p:nvPr/>
-      </p:nvGrpSpPr>
-      <p:grpSpPr>
-        <a:xfrm>
-          <a:off x="0" y="0"/>
-          <a:ext cx="0" cy="0"/>
-          <a:chOff x="0" y="0"/>
-          <a:chExt cx="0" cy="0"/>
-        </a:xfrm>
-      </p:grpSpPr>
-      <p:sp>
-        <p:nvSpPr>
-          <p:cNvPr id="4" name="Title 3"/>
-          <p:cNvSpPr>
-            <a:spLocks noGrp="1"/>
-          </p:cNvSpPr>
-          <p:nvPr>
-            <p:ph type="title"/>
-          </p:nvPr>
-        </p:nvSpPr>
-        <p:spPr/>
-        <p:txBody>
-          <a:bodyPr/>
-          <a:lstStyle/>
-          <a:p>
-            <a:r>
-              <a:rPr lang="en-US" dirty="0"/>
-              <a:t>Demo Data Model</a:t>
-            </a:r>
-          </a:p>
-        </p:txBody>
-      </p:sp>
-      <p:sp>
-        <p:nvSpPr>
-          <p:cNvPr id="2" name="Slide Number Placeholder 1"/>
-          <p:cNvSpPr>
-            <a:spLocks noGrp="1"/>
-          </p:cNvSpPr>
-          <p:nvPr>
-            <p:ph type="sldNum" sz="quarter" idx="12"/>
-          </p:nvPr>
-        </p:nvSpPr>
-        <p:spPr/>
-        <p:txBody>
-          <a:bodyPr/>
-          <a:lstStyle/>
-          <a:p>
-            <a:fld id="{4CA37C95-3A7F-4C90-9D28-0B573484ACDD}" type="slidenum">
-              <a:rPr lang="en-US" smtClean="0"/>
-              <a:pPr/>
-              <a:t>2</a:t>
-            </a:fld>
-            <a:endParaRPr lang="en-US"/>
-          </a:p>
-        </p:txBody>
-      </p:sp>
-      <p:pic>
-        <p:nvPicPr>
-          <p:cNvPr id="5" name="Picture 4"/>
-          <p:cNvPicPr>
-            <a:picLocks noChangeAspect="1"/>
-          </p:cNvPicPr>
-          <p:nvPr/>
-        </p:nvPicPr>
-        <p:blipFill>
-          <a:blip r:embed="rId2"/>
-          <a:stretch>
-            <a:fillRect/>
-          </a:stretch>
-        </p:blipFill>
-        <p:spPr>
-          <a:xfrm>
-            <a:off x="1563519" y="963675"/>
-            <a:ext cx="6218609" cy="3955773"/>
-          </a:xfrm>
-          <a:prstGeom prst="rect">
-            <a:avLst/>
-          </a:prstGeom>
-        </p:spPr>
-      </p:pic>
-    </p:spTree>
-    <p:extLst>
-      <p:ext uri="{BB962C8B-B14F-4D97-AF65-F5344CB8AC3E}">
-        <p14:creationId xmlns:p14="http://schemas.microsoft.com/office/powerpoint/2010/main" val="2976220986"/>
-      </p:ext>
-    </p:extLst>
-  </p:cSld>
-  <p:clrMapOvr>
-    <a:masterClrMapping/>
-  </p:clrMapOvr>
-</p:sld>
-</file>
-
-<file path=ppt/slides/slide20.xml><?xml version="1.0" encoding="utf-8"?>
+<file path=ppt/slides/slide21.xml><?xml version="1.0" encoding="utf-8"?>
 <p:sld xmlns:a="http://schemas.openxmlformats.org/drawingml/2006/main" xmlns:r="http://schemas.openxmlformats.org/officeDocument/2006/relationships" xmlns:p="http://schemas.openxmlformats.org/presentationml/2006/main">
   <p:cSld>
     <p:spTree>
@@ -26230,6 +27093,21 @@
 </file>
 
 <file path=customXml/item1.xml><?xml version="1.0" encoding="utf-8"?>
+<p:properties xmlns:p="http://schemas.microsoft.com/office/2006/metadata/properties" xmlns:xsi="http://www.w3.org/2001/XMLSchema-instance" xmlns:pc="http://schemas.microsoft.com/office/infopath/2007/PartnerControls">
+  <documentManagement/>
+</p:properties>
+</file>
+
+<file path=customXml/item2.xml><?xml version="1.0" encoding="utf-8"?>
+<?mso-contentType ?>
+<FormTemplates xmlns="http://schemas.microsoft.com/sharepoint/v3/contenttype/forms">
+  <Display>DocumentLibraryForm</Display>
+  <Edit>DocumentLibraryForm</Edit>
+  <New>DocumentLibraryForm</New>
+</FormTemplates>
+</file>
+
+<file path=customXml/item3.xml><?xml version="1.0" encoding="utf-8"?>
 <ct:contentTypeSchema xmlns:ct="http://schemas.microsoft.com/office/2006/metadata/contentType" xmlns:ma="http://schemas.microsoft.com/office/2006/metadata/properties/metaAttributes" ct:_="" ma:_="" ma:contentTypeName="Document" ma:contentTypeID="0x010100E736775483C978499D9195B260C24C73" ma:contentTypeVersion="0" ma:contentTypeDescription="Create a new document." ma:contentTypeScope="" ma:versionID="d4be1c598de8bc3e18f249f3da199b24">
   <xsd:schema xmlns:xsd="http://www.w3.org/2001/XMLSchema" xmlns:xs="http://www.w3.org/2001/XMLSchema" xmlns:p="http://schemas.microsoft.com/office/2006/metadata/properties" targetNamespace="http://schemas.microsoft.com/office/2006/metadata/properties" ma:root="true" ma:fieldsID="1b05d82d297216baf5b26c55225140df">
     <xsd:element name="properties">
@@ -26343,22 +27221,30 @@
 </ct:contentTypeSchema>
 </file>
 
-<file path=customXml/item2.xml><?xml version="1.0" encoding="utf-8"?>
-<?mso-contentType ?>
-<FormTemplates xmlns="http://schemas.microsoft.com/sharepoint/v3/contenttype/forms">
-  <Display>DocumentLibraryForm</Display>
-  <Edit>DocumentLibraryForm</Edit>
-  <New>DocumentLibraryForm</New>
-</FormTemplates>
+<file path=customXml/itemProps1.xml><?xml version="1.0" encoding="utf-8"?>
+<ds:datastoreItem xmlns:ds="http://schemas.openxmlformats.org/officeDocument/2006/customXml" ds:itemID="{310BA9E4-2DAA-49B9-9D9A-1DC7F9CCA4D9}">
+  <ds:schemaRefs>
+    <ds:schemaRef ds:uri="http://schemas.microsoft.com/office/infopath/2007/PartnerControls"/>
+    <ds:schemaRef ds:uri="http://purl.org/dc/elements/1.1/"/>
+    <ds:schemaRef ds:uri="http://schemas.microsoft.com/office/2006/metadata/properties"/>
+    <ds:schemaRef ds:uri="http://purl.org/dc/terms/"/>
+    <ds:schemaRef ds:uri="http://schemas.openxmlformats.org/package/2006/metadata/core-properties"/>
+    <ds:schemaRef ds:uri="http://schemas.microsoft.com/office/2006/documentManagement/types"/>
+    <ds:schemaRef ds:uri="http://www.w3.org/XML/1998/namespace"/>
+    <ds:schemaRef ds:uri="http://purl.org/dc/dcmitype/"/>
+  </ds:schemaRefs>
+</ds:datastoreItem>
 </file>
 
-<file path=customXml/item3.xml><?xml version="1.0" encoding="utf-8"?>
-<p:properties xmlns:p="http://schemas.microsoft.com/office/2006/metadata/properties" xmlns:xsi="http://www.w3.org/2001/XMLSchema-instance" xmlns:pc="http://schemas.microsoft.com/office/infopath/2007/PartnerControls">
-  <documentManagement/>
-</p:properties>
+<file path=customXml/itemProps2.xml><?xml version="1.0" encoding="utf-8"?>
+<ds:datastoreItem xmlns:ds="http://schemas.openxmlformats.org/officeDocument/2006/customXml" ds:itemID="{34511AA7-8D46-42C1-969B-5E843ADBDC40}">
+  <ds:schemaRefs>
+    <ds:schemaRef ds:uri="http://schemas.microsoft.com/sharepoint/v3/contenttype/forms"/>
+  </ds:schemaRefs>
+</ds:datastoreItem>
 </file>
 
-<file path=customXml/itemProps1.xml><?xml version="1.0" encoding="utf-8"?>
+<file path=customXml/itemProps3.xml><?xml version="1.0" encoding="utf-8"?>
 <ds:datastoreItem xmlns:ds="http://schemas.openxmlformats.org/officeDocument/2006/customXml" ds:itemID="{3A2FFB2F-91F2-4AF2-A1DF-F8BE65294594}">
   <ds:schemaRefs>
     <ds:schemaRef ds:uri="http://schemas.microsoft.com/office/2006/metadata/contentType"/>
@@ -26372,27 +27258,4 @@
     <ds:schemaRef ds:uri="http://schemas.microsoft.com/office/infopath/2007/PartnerControls"/>
   </ds:schemaRefs>
 </ds:datastoreItem>
-</file>
-
-<file path=customXml/itemProps2.xml><?xml version="1.0" encoding="utf-8"?>
-<ds:datastoreItem xmlns:ds="http://schemas.openxmlformats.org/officeDocument/2006/customXml" ds:itemID="{34511AA7-8D46-42C1-969B-5E843ADBDC40}">
-  <ds:schemaRefs>
-    <ds:schemaRef ds:uri="http://schemas.microsoft.com/sharepoint/v3/contenttype/forms"/>
-  </ds:schemaRefs>
-</ds:datastoreItem>
-</file>
-
-<file path=customXml/itemProps3.xml><?xml version="1.0" encoding="utf-8"?>
-<ds:datastoreItem xmlns:ds="http://schemas.openxmlformats.org/officeDocument/2006/customXml" ds:itemID="{310BA9E4-2DAA-49B9-9D9A-1DC7F9CCA4D9}">
-  <ds:schemaRefs>
-    <ds:schemaRef ds:uri="http://schemas.microsoft.com/office/infopath/2007/PartnerControls"/>
-    <ds:schemaRef ds:uri="http://purl.org/dc/elements/1.1/"/>
-    <ds:schemaRef ds:uri="http://schemas.microsoft.com/office/2006/metadata/properties"/>
-    <ds:schemaRef ds:uri="http://purl.org/dc/terms/"/>
-    <ds:schemaRef ds:uri="http://schemas.openxmlformats.org/package/2006/metadata/core-properties"/>
-    <ds:schemaRef ds:uri="http://schemas.microsoft.com/office/2006/documentManagement/types"/>
-    <ds:schemaRef ds:uri="http://www.w3.org/XML/1998/namespace"/>
-    <ds:schemaRef ds:uri="http://purl.org/dc/dcmitype/"/>
-  </ds:schemaRefs>
-</ds:datastoreItem>
 </file>
</xml_diff>

<commit_message>
Upgrading frameworks and test sdk
</commit_message>
<xml_diff>
--- a/EFPerf.pptx
+++ b/EFPerf.pptx
@@ -10074,7 +10074,7 @@
           <a:p>
             <a:fld id="{7B6A12C6-64DF-430F-A4DC-0FC62ED5BE2B}" type="datetime1">
               <a:rPr lang="en-US" smtClean="0"/>
-              <a:t>10/6/2018</a:t>
+              <a:t>9/5/2019</a:t>
             </a:fld>
             <a:endParaRPr lang="en-US" dirty="0"/>
           </a:p>
@@ -10240,7 +10240,7 @@
           <a:p>
             <a:fld id="{8209028B-9E3C-481D-8F79-63DDE9F2EC79}" type="datetime1">
               <a:rPr lang="en-US" smtClean="0"/>
-              <a:t>10/6/2018</a:t>
+              <a:t>9/5/2019</a:t>
             </a:fld>
             <a:endParaRPr lang="en-US" dirty="0"/>
           </a:p>
@@ -11306,7 +11306,7 @@
   <p:clrMapOvr>
     <a:masterClrMapping/>
   </p:clrMapOvr>
-  <p:extLst mod="1">
+  <p:extLst>
     <p:ext uri="{DCECCB84-F9BA-43D5-87BE-67443E8EF086}">
       <p15:sldGuideLst xmlns:p15="http://schemas.microsoft.com/office/powerpoint/2012/main">
         <p15:guide id="1" orient="horz" pos="1620">
@@ -12284,7 +12284,7 @@
           <a:p>
             <a:fld id="{CB293217-2C1A-4AAE-948E-700BCDD5810A}" type="datetimeFigureOut">
               <a:rPr lang="en-US" smtClean="0"/>
-              <a:t>10/6/2018</a:t>
+              <a:t>9/5/2019</a:t>
             </a:fld>
             <a:endParaRPr lang="en-US"/>
           </a:p>
@@ -12479,7 +12479,7 @@
           <a:p>
             <a:fld id="{CB293217-2C1A-4AAE-948E-700BCDD5810A}" type="datetimeFigureOut">
               <a:rPr lang="en-US" smtClean="0"/>
-              <a:t>10/6/2018</a:t>
+              <a:t>9/5/2019</a:t>
             </a:fld>
             <a:endParaRPr lang="en-US"/>
           </a:p>
@@ -14145,7 +14145,7 @@
   <p:clrMapOvr>
     <a:masterClrMapping/>
   </p:clrMapOvr>
-  <p:extLst mod="1">
+  <p:extLst>
     <p:ext uri="{DCECCB84-F9BA-43D5-87BE-67443E8EF086}">
       <p15:sldGuideLst xmlns:p15="http://schemas.microsoft.com/office/powerpoint/2012/main">
         <p15:guide id="1" orient="horz" pos="1620">
@@ -15433,7 +15433,7 @@
   <p:clrMapOvr>
     <a:masterClrMapping/>
   </p:clrMapOvr>
-  <p:extLst mod="1">
+  <p:extLst>
     <p:ext uri="{DCECCB84-F9BA-43D5-87BE-67443E8EF086}">
       <p15:sldGuideLst xmlns:p15="http://schemas.microsoft.com/office/powerpoint/2012/main">
         <p15:guide id="1" orient="horz" pos="1620">
@@ -16143,7 +16143,7 @@
   <p:clrMapOvr>
     <a:masterClrMapping/>
   </p:clrMapOvr>
-  <p:extLst mod="1">
+  <p:extLst>
     <p:ext uri="{DCECCB84-F9BA-43D5-87BE-67443E8EF086}">
       <p15:sldGuideLst xmlns:p15="http://schemas.microsoft.com/office/powerpoint/2012/main">
         <p15:guide id="1" orient="horz" pos="1620">
@@ -18184,7 +18184,7 @@
   <p:clrMapOvr>
     <a:masterClrMapping/>
   </p:clrMapOvr>
-  <p:extLst mod="1">
+  <p:extLst>
     <p:ext uri="{DCECCB84-F9BA-43D5-87BE-67443E8EF086}">
       <p15:sldGuideLst xmlns:p15="http://schemas.microsoft.com/office/powerpoint/2012/main">
         <p15:guide id="1" orient="horz" pos="1620">
@@ -18442,7 +18442,7 @@
   <p:clrMapOvr>
     <a:masterClrMapping/>
   </p:clrMapOvr>
-  <p:extLst mod="1">
+  <p:extLst>
     <p:ext uri="{DCECCB84-F9BA-43D5-87BE-67443E8EF086}">
       <p15:sldGuideLst xmlns:p15="http://schemas.microsoft.com/office/powerpoint/2012/main">
         <p15:guide id="1" orient="horz" pos="1620">
@@ -19091,7 +19091,7 @@
       </a:lvl9pPr>
     </p:otherStyle>
   </p:txStyles>
-  <p:extLst mod="1">
+  <p:extLst>
     <p:ext uri="{27BBF7A9-308A-43DC-89C8-2F10F3537804}">
       <p15:sldGuideLst xmlns:p15="http://schemas.microsoft.com/office/powerpoint/2012/main">
         <p15:guide id="1" orient="horz" pos="1620" userDrawn="1">
@@ -20465,7 +20465,6 @@
           </p:cNvGraphicFramePr>
           <p:nvPr>
             <p:ph idx="1"/>
-            <p:extLst/>
           </p:nvPr>
         </p:nvGraphicFramePr>
         <p:xfrm>
@@ -20862,7 +20861,6 @@
           </p:cNvGraphicFramePr>
           <p:nvPr>
             <p:ph idx="1"/>
-            <p:extLst/>
           </p:nvPr>
         </p:nvGraphicFramePr>
         <p:xfrm>
@@ -21718,12 +21716,12 @@
         <p:spPr>
           <a:xfrm>
             <a:off x="390525" y="1067725"/>
-            <a:ext cx="8357616" cy="2191369"/>
+            <a:ext cx="8357616" cy="3801931"/>
           </a:xfrm>
         </p:spPr>
         <p:txBody>
           <a:bodyPr>
-            <a:normAutofit lnSpcReduction="10000"/>
+            <a:normAutofit/>
           </a:bodyPr>
           <a:lstStyle/>
           <a:p>
@@ -21770,7 +21768,12 @@
               <a:rPr lang="en-US" baseline="0" dirty="0"/>
               <a:t>Break context up with large models</a:t>
             </a:r>
-            <a:endParaRPr lang="en-US" dirty="0"/>
+          </a:p>
+          <a:p>
+            <a:r>
+              <a:rPr lang="en-US" dirty="0"/>
+              <a:t>Beware of type coercion/computed values</a:t>
+            </a:r>
           </a:p>
         </p:txBody>
       </p:sp>
@@ -27093,21 +27096,6 @@
 </file>
 
 <file path=customXml/item1.xml><?xml version="1.0" encoding="utf-8"?>
-<p:properties xmlns:p="http://schemas.microsoft.com/office/2006/metadata/properties" xmlns:xsi="http://www.w3.org/2001/XMLSchema-instance" xmlns:pc="http://schemas.microsoft.com/office/infopath/2007/PartnerControls">
-  <documentManagement/>
-</p:properties>
-</file>
-
-<file path=customXml/item2.xml><?xml version="1.0" encoding="utf-8"?>
-<?mso-contentType ?>
-<FormTemplates xmlns="http://schemas.microsoft.com/sharepoint/v3/contenttype/forms">
-  <Display>DocumentLibraryForm</Display>
-  <Edit>DocumentLibraryForm</Edit>
-  <New>DocumentLibraryForm</New>
-</FormTemplates>
-</file>
-
-<file path=customXml/item3.xml><?xml version="1.0" encoding="utf-8"?>
 <ct:contentTypeSchema xmlns:ct="http://schemas.microsoft.com/office/2006/metadata/contentType" xmlns:ma="http://schemas.microsoft.com/office/2006/metadata/properties/metaAttributes" ct:_="" ma:_="" ma:contentTypeName="Document" ma:contentTypeID="0x010100E736775483C978499D9195B260C24C73" ma:contentTypeVersion="0" ma:contentTypeDescription="Create a new document." ma:contentTypeScope="" ma:versionID="d4be1c598de8bc3e18f249f3da199b24">
   <xsd:schema xmlns:xsd="http://www.w3.org/2001/XMLSchema" xmlns:xs="http://www.w3.org/2001/XMLSchema" xmlns:p="http://schemas.microsoft.com/office/2006/metadata/properties" targetNamespace="http://schemas.microsoft.com/office/2006/metadata/properties" ma:root="true" ma:fieldsID="1b05d82d297216baf5b26c55225140df">
     <xsd:element name="properties">
@@ -27221,17 +27209,33 @@
 </ct:contentTypeSchema>
 </file>
 
+<file path=customXml/item2.xml><?xml version="1.0" encoding="utf-8"?>
+<?mso-contentType ?>
+<FormTemplates xmlns="http://schemas.microsoft.com/sharepoint/v3/contenttype/forms">
+  <Display>DocumentLibraryForm</Display>
+  <Edit>DocumentLibraryForm</Edit>
+  <New>DocumentLibraryForm</New>
+</FormTemplates>
+</file>
+
+<file path=customXml/item3.xml><?xml version="1.0" encoding="utf-8"?>
+<p:properties xmlns:p="http://schemas.microsoft.com/office/2006/metadata/properties" xmlns:xsi="http://www.w3.org/2001/XMLSchema-instance" xmlns:pc="http://schemas.microsoft.com/office/infopath/2007/PartnerControls">
+  <documentManagement/>
+</p:properties>
+</file>
+
 <file path=customXml/itemProps1.xml><?xml version="1.0" encoding="utf-8"?>
-<ds:datastoreItem xmlns:ds="http://schemas.openxmlformats.org/officeDocument/2006/customXml" ds:itemID="{310BA9E4-2DAA-49B9-9D9A-1DC7F9CCA4D9}">
+<ds:datastoreItem xmlns:ds="http://schemas.openxmlformats.org/officeDocument/2006/customXml" ds:itemID="{3A2FFB2F-91F2-4AF2-A1DF-F8BE65294594}">
   <ds:schemaRefs>
+    <ds:schemaRef ds:uri="http://schemas.microsoft.com/office/2006/metadata/contentType"/>
+    <ds:schemaRef ds:uri="http://schemas.microsoft.com/office/2006/metadata/properties/metaAttributes"/>
+    <ds:schemaRef ds:uri="http://www.w3.org/2001/XMLSchema"/>
+    <ds:schemaRef ds:uri="http://schemas.microsoft.com/office/2006/metadata/properties"/>
+    <ds:schemaRef ds:uri="http://schemas.openxmlformats.org/package/2006/metadata/core-properties"/>
+    <ds:schemaRef ds:uri="http://purl.org/dc/elements/1.1/"/>
+    <ds:schemaRef ds:uri="http://purl.org/dc/terms/"/>
+    <ds:schemaRef ds:uri="http://schemas.microsoft.com/internal/obd"/>
     <ds:schemaRef ds:uri="http://schemas.microsoft.com/office/infopath/2007/PartnerControls"/>
-    <ds:schemaRef ds:uri="http://purl.org/dc/elements/1.1/"/>
-    <ds:schemaRef ds:uri="http://schemas.microsoft.com/office/2006/metadata/properties"/>
-    <ds:schemaRef ds:uri="http://purl.org/dc/terms/"/>
-    <ds:schemaRef ds:uri="http://schemas.openxmlformats.org/package/2006/metadata/core-properties"/>
-    <ds:schemaRef ds:uri="http://schemas.microsoft.com/office/2006/documentManagement/types"/>
-    <ds:schemaRef ds:uri="http://www.w3.org/XML/1998/namespace"/>
-    <ds:schemaRef ds:uri="http://purl.org/dc/dcmitype/"/>
   </ds:schemaRefs>
 </ds:datastoreItem>
 </file>
@@ -27245,17 +27249,16 @@
 </file>
 
 <file path=customXml/itemProps3.xml><?xml version="1.0" encoding="utf-8"?>
-<ds:datastoreItem xmlns:ds="http://schemas.openxmlformats.org/officeDocument/2006/customXml" ds:itemID="{3A2FFB2F-91F2-4AF2-A1DF-F8BE65294594}">
+<ds:datastoreItem xmlns:ds="http://schemas.openxmlformats.org/officeDocument/2006/customXml" ds:itemID="{310BA9E4-2DAA-49B9-9D9A-1DC7F9CCA4D9}">
   <ds:schemaRefs>
-    <ds:schemaRef ds:uri="http://schemas.microsoft.com/office/2006/metadata/contentType"/>
-    <ds:schemaRef ds:uri="http://schemas.microsoft.com/office/2006/metadata/properties/metaAttributes"/>
-    <ds:schemaRef ds:uri="http://www.w3.org/2001/XMLSchema"/>
+    <ds:schemaRef ds:uri="http://schemas.microsoft.com/office/infopath/2007/PartnerControls"/>
+    <ds:schemaRef ds:uri="http://purl.org/dc/elements/1.1/"/>
     <ds:schemaRef ds:uri="http://schemas.microsoft.com/office/2006/metadata/properties"/>
+    <ds:schemaRef ds:uri="http://purl.org/dc/terms/"/>
     <ds:schemaRef ds:uri="http://schemas.openxmlformats.org/package/2006/metadata/core-properties"/>
-    <ds:schemaRef ds:uri="http://purl.org/dc/elements/1.1/"/>
-    <ds:schemaRef ds:uri="http://purl.org/dc/terms/"/>
-    <ds:schemaRef ds:uri="http://schemas.microsoft.com/internal/obd"/>
-    <ds:schemaRef ds:uri="http://schemas.microsoft.com/office/infopath/2007/PartnerControls"/>
+    <ds:schemaRef ds:uri="http://schemas.microsoft.com/office/2006/documentManagement/types"/>
+    <ds:schemaRef ds:uri="http://www.w3.org/XML/1998/namespace"/>
+    <ds:schemaRef ds:uri="http://purl.org/dc/dcmitype/"/>
   </ds:schemaRefs>
 </ds:datastoreItem>
 </file>
</xml_diff>

<commit_message>
Update to align with database used for the core projects
</commit_message>
<xml_diff>
--- a/EFPerf.pptx
+++ b/EFPerf.pptx
@@ -6,10 +6,10 @@
     <p:sldMasterId id="2147483850" r:id="rId5"/>
   </p:sldMasterIdLst>
   <p:notesMasterIdLst>
-    <p:notesMasterId r:id="rId27"/>
+    <p:notesMasterId r:id="rId28"/>
   </p:notesMasterIdLst>
   <p:handoutMasterIdLst>
-    <p:handoutMasterId r:id="rId28"/>
+    <p:handoutMasterId r:id="rId29"/>
   </p:handoutMasterIdLst>
   <p:sldIdLst>
     <p:sldId id="594" r:id="rId6"/>
@@ -23,16 +23,17 @@
     <p:sldId id="617" r:id="rId14"/>
     <p:sldId id="605" r:id="rId15"/>
     <p:sldId id="624" r:id="rId16"/>
-    <p:sldId id="621" r:id="rId17"/>
-    <p:sldId id="619" r:id="rId18"/>
-    <p:sldId id="620" r:id="rId19"/>
-    <p:sldId id="280" r:id="rId20"/>
-    <p:sldId id="622" r:id="rId21"/>
-    <p:sldId id="607" r:id="rId22"/>
-    <p:sldId id="609" r:id="rId23"/>
-    <p:sldId id="613" r:id="rId24"/>
-    <p:sldId id="612" r:id="rId25"/>
-    <p:sldId id="616" r:id="rId26"/>
+    <p:sldId id="625" r:id="rId17"/>
+    <p:sldId id="621" r:id="rId18"/>
+    <p:sldId id="619" r:id="rId19"/>
+    <p:sldId id="620" r:id="rId20"/>
+    <p:sldId id="280" r:id="rId21"/>
+    <p:sldId id="622" r:id="rId22"/>
+    <p:sldId id="607" r:id="rId23"/>
+    <p:sldId id="609" r:id="rId24"/>
+    <p:sldId id="613" r:id="rId25"/>
+    <p:sldId id="612" r:id="rId26"/>
+    <p:sldId id="616" r:id="rId27"/>
   </p:sldIdLst>
   <p:sldSz cx="9144000" cy="5143500" type="screen16x9"/>
   <p:notesSz cx="6954838" cy="11984038"/>
@@ -10074,7 +10075,7 @@
           <a:p>
             <a:fld id="{7B6A12C6-64DF-430F-A4DC-0FC62ED5BE2B}" type="datetime1">
               <a:rPr lang="en-US" smtClean="0"/>
-              <a:t>10/28/2019</a:t>
+              <a:t>6/20/2021</a:t>
             </a:fld>
             <a:endParaRPr lang="en-US" dirty="0"/>
           </a:p>
@@ -10240,7 +10241,7 @@
           <a:p>
             <a:fld id="{8209028B-9E3C-481D-8F79-63DDE9F2EC79}" type="datetime1">
               <a:rPr lang="en-US" smtClean="0"/>
-              <a:t>10/28/2019</a:t>
+              <a:t>6/20/2021</a:t>
             </a:fld>
             <a:endParaRPr lang="en-US" dirty="0"/>
           </a:p>
@@ -10799,7 +10800,7 @@
           <a:p>
             <a:fld id="{64F1725A-9B26-466A-BD1F-095DBF2836CB}" type="slidenum">
               <a:rPr lang="en-US" smtClean="0"/>
-              <a:t>18</a:t>
+              <a:t>19</a:t>
             </a:fld>
             <a:endParaRPr lang="en-US"/>
           </a:p>
@@ -10883,7 +10884,7 @@
           <a:p>
             <a:fld id="{0212BA2B-C688-4DBA-9DA4-68E8380D5874}" type="slidenum">
               <a:rPr lang="en-US" smtClean="0"/>
-              <a:t>21</a:t>
+              <a:t>22</a:t>
             </a:fld>
             <a:endParaRPr lang="en-US"/>
           </a:p>
@@ -12284,7 +12285,7 @@
           <a:p>
             <a:fld id="{CB293217-2C1A-4AAE-948E-700BCDD5810A}" type="datetimeFigureOut">
               <a:rPr lang="en-US" smtClean="0"/>
-              <a:t>10/28/2019</a:t>
+              <a:t>6/20/2021</a:t>
             </a:fld>
             <a:endParaRPr lang="en-US"/>
           </a:p>
@@ -12479,7 +12480,7 @@
           <a:p>
             <a:fld id="{CB293217-2C1A-4AAE-948E-700BCDD5810A}" type="datetimeFigureOut">
               <a:rPr lang="en-US" smtClean="0"/>
-              <a:t>10/28/2019</a:t>
+              <a:t>6/20/2021</a:t>
             </a:fld>
             <a:endParaRPr lang="en-US"/>
           </a:p>
@@ -20748,7 +20749,7 @@
         <p:spPr>
           <a:xfrm>
             <a:off x="0" y="95964"/>
-            <a:ext cx="8937062" cy="4770537"/>
+            <a:ext cx="9935733" cy="5078313"/>
           </a:xfrm>
           <a:prstGeom prst="rect">
             <a:avLst/>
@@ -21163,15 +21164,162 @@
             </a:endParaRPr>
           </a:p>
           <a:p>
-            <a:endParaRPr lang="en-US" sz="1600" dirty="0">
-              <a:solidFill>
-                <a:srgbClr val="000000"/>
-              </a:solidFill>
-              <a:latin typeface="Consolas" panose="020B0609020204030204" pitchFamily="49" charset="0"/>
-            </a:endParaRPr>
-          </a:p>
-          <a:p>
-            <a:endParaRPr lang="en-US" sz="1600" dirty="0">
+            <a:r>
+              <a:rPr lang="en-US" sz="1600" dirty="0">
+                <a:solidFill>
+                  <a:srgbClr val="000000"/>
+                </a:solidFill>
+                <a:latin typeface="Consolas" panose="020B0609020204030204" pitchFamily="49" charset="0"/>
+              </a:rPr>
+              <a:t>Core 5:</a:t>
+            </a:r>
+          </a:p>
+          <a:p>
+            <a:r>
+              <a:rPr lang="en-US" dirty="0">
+                <a:solidFill>
+                  <a:srgbClr val="0000FF"/>
+                </a:solidFill>
+                <a:latin typeface="Consolas" panose="020B0609020204030204" pitchFamily="49" charset="0"/>
+              </a:rPr>
+              <a:t>protected</a:t>
+            </a:r>
+            <a:r>
+              <a:rPr lang="en-US" dirty="0">
+                <a:solidFill>
+                  <a:srgbClr val="000000"/>
+                </a:solidFill>
+                <a:latin typeface="Consolas" panose="020B0609020204030204" pitchFamily="49" charset="0"/>
+              </a:rPr>
+              <a:t> </a:t>
+            </a:r>
+            <a:r>
+              <a:rPr lang="en-US" dirty="0">
+                <a:solidFill>
+                  <a:srgbClr val="0000FF"/>
+                </a:solidFill>
+                <a:latin typeface="Consolas" panose="020B0609020204030204" pitchFamily="49" charset="0"/>
+              </a:rPr>
+              <a:t>override</a:t>
+            </a:r>
+            <a:r>
+              <a:rPr lang="en-US" dirty="0">
+                <a:solidFill>
+                  <a:srgbClr val="000000"/>
+                </a:solidFill>
+                <a:latin typeface="Consolas" panose="020B0609020204030204" pitchFamily="49" charset="0"/>
+              </a:rPr>
+              <a:t> </a:t>
+            </a:r>
+            <a:r>
+              <a:rPr lang="en-US" dirty="0">
+                <a:solidFill>
+                  <a:srgbClr val="0000FF"/>
+                </a:solidFill>
+                <a:latin typeface="Consolas" panose="020B0609020204030204" pitchFamily="49" charset="0"/>
+              </a:rPr>
+              <a:t>void</a:t>
+            </a:r>
+            <a:r>
+              <a:rPr lang="en-US" dirty="0">
+                <a:solidFill>
+                  <a:srgbClr val="000000"/>
+                </a:solidFill>
+                <a:latin typeface="Consolas" panose="020B0609020204030204" pitchFamily="49" charset="0"/>
+              </a:rPr>
+              <a:t> </a:t>
+            </a:r>
+            <a:r>
+              <a:rPr lang="en-US" dirty="0" err="1">
+                <a:solidFill>
+                  <a:srgbClr val="000000"/>
+                </a:solidFill>
+                <a:latin typeface="Consolas" panose="020B0609020204030204" pitchFamily="49" charset="0"/>
+              </a:rPr>
+              <a:t>OnConfiguring</a:t>
+            </a:r>
+            <a:r>
+              <a:rPr lang="en-US" dirty="0">
+                <a:solidFill>
+                  <a:srgbClr val="000000"/>
+                </a:solidFill>
+                <a:latin typeface="Consolas" panose="020B0609020204030204" pitchFamily="49" charset="0"/>
+              </a:rPr>
+              <a:t>(</a:t>
+            </a:r>
+            <a:r>
+              <a:rPr lang="en-US" dirty="0" err="1">
+                <a:solidFill>
+                  <a:srgbClr val="000000"/>
+                </a:solidFill>
+                <a:latin typeface="Consolas" panose="020B0609020204030204" pitchFamily="49" charset="0"/>
+              </a:rPr>
+              <a:t>DbContextOptionsBuilder</a:t>
+            </a:r>
+            <a:r>
+              <a:rPr lang="en-US" dirty="0">
+                <a:solidFill>
+                  <a:srgbClr val="000000"/>
+                </a:solidFill>
+                <a:latin typeface="Consolas" panose="020B0609020204030204" pitchFamily="49" charset="0"/>
+              </a:rPr>
+              <a:t> </a:t>
+            </a:r>
+            <a:r>
+              <a:rPr lang="en-US" dirty="0" err="1">
+                <a:solidFill>
+                  <a:srgbClr val="000000"/>
+                </a:solidFill>
+                <a:latin typeface="Consolas" panose="020B0609020204030204" pitchFamily="49" charset="0"/>
+              </a:rPr>
+              <a:t>optionsBuilder</a:t>
+            </a:r>
+            <a:r>
+              <a:rPr lang="en-US" dirty="0">
+                <a:solidFill>
+                  <a:srgbClr val="000000"/>
+                </a:solidFill>
+                <a:latin typeface="Consolas" panose="020B0609020204030204" pitchFamily="49" charset="0"/>
+              </a:rPr>
+              <a:t>)</a:t>
+            </a:r>
+          </a:p>
+          <a:p>
+            <a:r>
+              <a:rPr lang="en-US" dirty="0"/>
+              <a:t>	 </a:t>
+            </a:r>
+            <a:r>
+              <a:rPr lang="en-US" dirty="0">
+                <a:latin typeface="Consolas" panose="020B0609020204030204" pitchFamily="49" charset="0"/>
+              </a:rPr>
+              <a:t>=&gt; </a:t>
+            </a:r>
+            <a:r>
+              <a:rPr lang="en-US" dirty="0" err="1">
+                <a:latin typeface="Consolas" panose="020B0609020204030204" pitchFamily="49" charset="0"/>
+              </a:rPr>
+              <a:t>optionsBuilder.LogTo</a:t>
+            </a:r>
+            <a:r>
+              <a:rPr lang="en-US" dirty="0">
+                <a:latin typeface="Consolas" panose="020B0609020204030204" pitchFamily="49" charset="0"/>
+              </a:rPr>
+              <a:t>(</a:t>
+            </a:r>
+            <a:r>
+              <a:rPr lang="en-US" dirty="0" err="1">
+                <a:latin typeface="Consolas" panose="020B0609020204030204" pitchFamily="49" charset="0"/>
+              </a:rPr>
+              <a:t>Console.WriteLine</a:t>
+            </a:r>
+            <a:r>
+              <a:rPr lang="en-US" dirty="0">
+                <a:latin typeface="Consolas" panose="020B0609020204030204" pitchFamily="49" charset="0"/>
+              </a:rPr>
+              <a:t>);</a:t>
+            </a:r>
+            <a:endParaRPr lang="en-US" dirty="0">
               <a:solidFill>
                 <a:srgbClr val="000000"/>
               </a:solidFill>
@@ -21463,6 +21611,367 @@
       </p:grpSpPr>
       <p:sp>
         <p:nvSpPr>
+          <p:cNvPr id="2" name="Title 1">
+            <a:extLst>
+              <a:ext uri="{FF2B5EF4-FFF2-40B4-BE49-F238E27FC236}">
+                <a16:creationId xmlns:a16="http://schemas.microsoft.com/office/drawing/2014/main" id="{58DB0A33-EE42-48F5-ADEA-B33710294279}"/>
+              </a:ext>
+            </a:extLst>
+          </p:cNvPr>
+          <p:cNvSpPr>
+            <a:spLocks noGrp="1"/>
+          </p:cNvSpPr>
+          <p:nvPr>
+            <p:ph type="title"/>
+          </p:nvPr>
+        </p:nvSpPr>
+        <p:spPr/>
+        <p:txBody>
+          <a:bodyPr/>
+          <a:lstStyle/>
+          <a:p>
+            <a:r>
+              <a:rPr lang="en-US" dirty="0"/>
+              <a:t>Core 2 + </a:t>
+            </a:r>
+            <a:r>
+              <a:rPr lang="en-US" dirty="0" err="1"/>
+              <a:t>TagWith</a:t>
+            </a:r>
+            <a:endParaRPr lang="en-US" dirty="0"/>
+          </a:p>
+        </p:txBody>
+      </p:sp>
+      <p:sp>
+        <p:nvSpPr>
+          <p:cNvPr id="3" name="Content Placeholder 2">
+            <a:extLst>
+              <a:ext uri="{FF2B5EF4-FFF2-40B4-BE49-F238E27FC236}">
+                <a16:creationId xmlns:a16="http://schemas.microsoft.com/office/drawing/2014/main" id="{470605A2-42A7-4F88-9B12-C949C9000F72}"/>
+              </a:ext>
+            </a:extLst>
+          </p:cNvPr>
+          <p:cNvSpPr>
+            <a:spLocks noGrp="1"/>
+          </p:cNvSpPr>
+          <p:nvPr>
+            <p:ph idx="1"/>
+          </p:nvPr>
+        </p:nvSpPr>
+        <p:spPr/>
+        <p:txBody>
+          <a:bodyPr/>
+          <a:lstStyle/>
+          <a:p>
+            <a:pPr marL="0" indent="0">
+              <a:buNone/>
+            </a:pPr>
+            <a:r>
+              <a:rPr lang="en-US" sz="1800" dirty="0">
+                <a:solidFill>
+                  <a:srgbClr val="0000FF"/>
+                </a:solidFill>
+                <a:latin typeface="Consolas" panose="020B0609020204030204" pitchFamily="49" charset="0"/>
+              </a:rPr>
+              <a:t>var</a:t>
+            </a:r>
+            <a:r>
+              <a:rPr lang="en-US" sz="1800" dirty="0">
+                <a:solidFill>
+                  <a:srgbClr val="000000"/>
+                </a:solidFill>
+                <a:latin typeface="Consolas" panose="020B0609020204030204" pitchFamily="49" charset="0"/>
+              </a:rPr>
+              <a:t> brownies = </a:t>
+            </a:r>
+          </a:p>
+          <a:p>
+            <a:pPr marL="0" indent="0">
+              <a:buNone/>
+            </a:pPr>
+            <a:r>
+              <a:rPr lang="en-US" sz="1800" dirty="0">
+                <a:solidFill>
+                  <a:srgbClr val="000000"/>
+                </a:solidFill>
+                <a:latin typeface="Consolas" panose="020B0609020204030204" pitchFamily="49" charset="0"/>
+              </a:rPr>
+              <a:t>    </a:t>
+            </a:r>
+            <a:r>
+              <a:rPr lang="en-US" sz="1800" dirty="0">
+                <a:solidFill>
+                  <a:srgbClr val="0000FF"/>
+                </a:solidFill>
+                <a:latin typeface="Consolas" panose="020B0609020204030204" pitchFamily="49" charset="0"/>
+              </a:rPr>
+              <a:t>from</a:t>
+            </a:r>
+            <a:r>
+              <a:rPr lang="en-US" sz="1800" dirty="0">
+                <a:solidFill>
+                  <a:srgbClr val="000000"/>
+                </a:solidFill>
+                <a:latin typeface="Consolas" panose="020B0609020204030204" pitchFamily="49" charset="0"/>
+              </a:rPr>
+              <a:t> recipe </a:t>
+            </a:r>
+            <a:r>
+              <a:rPr lang="en-US" sz="1800" dirty="0">
+                <a:solidFill>
+                  <a:srgbClr val="0000FF"/>
+                </a:solidFill>
+                <a:latin typeface="Consolas" panose="020B0609020204030204" pitchFamily="49" charset="0"/>
+              </a:rPr>
+              <a:t>in</a:t>
+            </a:r>
+            <a:r>
+              <a:rPr lang="en-US" sz="1800" dirty="0">
+                <a:solidFill>
+                  <a:srgbClr val="000000"/>
+                </a:solidFill>
+                <a:latin typeface="Consolas" panose="020B0609020204030204" pitchFamily="49" charset="0"/>
+              </a:rPr>
+              <a:t> </a:t>
+            </a:r>
+            <a:r>
+              <a:rPr lang="en-US" sz="1800" dirty="0" err="1">
+                <a:solidFill>
+                  <a:srgbClr val="000000"/>
+                </a:solidFill>
+                <a:latin typeface="Consolas" panose="020B0609020204030204" pitchFamily="49" charset="0"/>
+              </a:rPr>
+              <a:t>dc.Recipes.TagWith</a:t>
+            </a:r>
+            <a:r>
+              <a:rPr lang="en-US" sz="1800" dirty="0">
+                <a:solidFill>
+                  <a:srgbClr val="000000"/>
+                </a:solidFill>
+                <a:latin typeface="Consolas" panose="020B0609020204030204" pitchFamily="49" charset="0"/>
+              </a:rPr>
+              <a:t>(</a:t>
+            </a:r>
+            <a:r>
+              <a:rPr lang="en-US" sz="1800" dirty="0">
+                <a:solidFill>
+                  <a:srgbClr val="A31515"/>
+                </a:solidFill>
+                <a:latin typeface="Consolas" panose="020B0609020204030204" pitchFamily="49" charset="0"/>
+              </a:rPr>
+              <a:t>"Testing Tag With"</a:t>
+            </a:r>
+            <a:r>
+              <a:rPr lang="en-US" sz="1800" dirty="0">
+                <a:solidFill>
+                  <a:srgbClr val="000000"/>
+                </a:solidFill>
+                <a:latin typeface="Consolas" panose="020B0609020204030204" pitchFamily="49" charset="0"/>
+              </a:rPr>
+              <a:t>)</a:t>
+            </a:r>
+          </a:p>
+          <a:p>
+            <a:pPr marL="0" indent="0">
+              <a:buNone/>
+            </a:pPr>
+            <a:r>
+              <a:rPr lang="en-US" sz="1800" dirty="0">
+                <a:solidFill>
+                  <a:srgbClr val="000000"/>
+                </a:solidFill>
+                <a:latin typeface="Consolas" panose="020B0609020204030204" pitchFamily="49" charset="0"/>
+              </a:rPr>
+              <a:t>    </a:t>
+            </a:r>
+            <a:r>
+              <a:rPr lang="en-US" sz="1800" dirty="0">
+                <a:solidFill>
+                  <a:srgbClr val="0000FF"/>
+                </a:solidFill>
+                <a:latin typeface="Consolas" panose="020B0609020204030204" pitchFamily="49" charset="0"/>
+              </a:rPr>
+              <a:t>where</a:t>
+            </a:r>
+            <a:r>
+              <a:rPr lang="en-US" sz="1800" dirty="0">
+                <a:solidFill>
+                  <a:srgbClr val="000000"/>
+                </a:solidFill>
+                <a:latin typeface="Consolas" panose="020B0609020204030204" pitchFamily="49" charset="0"/>
+              </a:rPr>
+              <a:t> </a:t>
+            </a:r>
+            <a:r>
+              <a:rPr lang="en-US" sz="1800" dirty="0" err="1">
+                <a:solidFill>
+                  <a:srgbClr val="000000"/>
+                </a:solidFill>
+                <a:latin typeface="Consolas" panose="020B0609020204030204" pitchFamily="49" charset="0"/>
+              </a:rPr>
+              <a:t>EF.Functions.Like</a:t>
+            </a:r>
+            <a:r>
+              <a:rPr lang="en-US" sz="1800" dirty="0">
+                <a:solidFill>
+                  <a:srgbClr val="000000"/>
+                </a:solidFill>
+                <a:latin typeface="Consolas" panose="020B0609020204030204" pitchFamily="49" charset="0"/>
+              </a:rPr>
+              <a:t>(</a:t>
+            </a:r>
+            <a:r>
+              <a:rPr lang="en-US" sz="1800" dirty="0" err="1">
+                <a:solidFill>
+                  <a:srgbClr val="000000"/>
+                </a:solidFill>
+                <a:latin typeface="Consolas" panose="020B0609020204030204" pitchFamily="49" charset="0"/>
+              </a:rPr>
+              <a:t>recipe.Title</a:t>
+            </a:r>
+            <a:r>
+              <a:rPr lang="en-US" sz="1800" dirty="0">
+                <a:solidFill>
+                  <a:srgbClr val="000000"/>
+                </a:solidFill>
+                <a:latin typeface="Consolas" panose="020B0609020204030204" pitchFamily="49" charset="0"/>
+              </a:rPr>
+              <a:t>, </a:t>
+            </a:r>
+            <a:r>
+              <a:rPr lang="en-US" sz="1800" dirty="0">
+                <a:solidFill>
+                  <a:srgbClr val="A31515"/>
+                </a:solidFill>
+                <a:latin typeface="Consolas" panose="020B0609020204030204" pitchFamily="49" charset="0"/>
+              </a:rPr>
+              <a:t>"%brownie%"</a:t>
+            </a:r>
+            <a:r>
+              <a:rPr lang="en-US" sz="1800" dirty="0">
+                <a:solidFill>
+                  <a:srgbClr val="000000"/>
+                </a:solidFill>
+                <a:latin typeface="Consolas" panose="020B0609020204030204" pitchFamily="49" charset="0"/>
+              </a:rPr>
+              <a:t>)</a:t>
+            </a:r>
+          </a:p>
+          <a:p>
+            <a:pPr marL="0" indent="0">
+              <a:buNone/>
+            </a:pPr>
+            <a:r>
+              <a:rPr lang="en-US" sz="1800">
+                <a:solidFill>
+                  <a:srgbClr val="000000"/>
+                </a:solidFill>
+                <a:latin typeface="Consolas" panose="020B0609020204030204" pitchFamily="49" charset="0"/>
+              </a:rPr>
+              <a:t>    </a:t>
+            </a:r>
+            <a:r>
+              <a:rPr lang="en-US" sz="1800">
+                <a:solidFill>
+                  <a:srgbClr val="0000FF"/>
+                </a:solidFill>
+                <a:latin typeface="Consolas" panose="020B0609020204030204" pitchFamily="49" charset="0"/>
+              </a:rPr>
+              <a:t>select</a:t>
+            </a:r>
+            <a:r>
+              <a:rPr lang="en-US" sz="1800">
+                <a:solidFill>
+                  <a:srgbClr val="000000"/>
+                </a:solidFill>
+                <a:latin typeface="Consolas" panose="020B0609020204030204" pitchFamily="49" charset="0"/>
+              </a:rPr>
+              <a:t> </a:t>
+            </a:r>
+            <a:r>
+              <a:rPr lang="en-US" sz="1800" dirty="0" err="1">
+                <a:solidFill>
+                  <a:srgbClr val="000000"/>
+                </a:solidFill>
+                <a:latin typeface="Consolas" panose="020B0609020204030204" pitchFamily="49" charset="0"/>
+              </a:rPr>
+              <a:t>recipe.Title</a:t>
+            </a:r>
+            <a:r>
+              <a:rPr lang="en-US" sz="1800" dirty="0">
+                <a:solidFill>
+                  <a:srgbClr val="000000"/>
+                </a:solidFill>
+                <a:latin typeface="Consolas" panose="020B0609020204030204" pitchFamily="49" charset="0"/>
+              </a:rPr>
+              <a:t>;</a:t>
+            </a:r>
+            <a:endParaRPr lang="en-US" dirty="0"/>
+          </a:p>
+        </p:txBody>
+      </p:sp>
+      <p:sp>
+        <p:nvSpPr>
+          <p:cNvPr id="4" name="Slide Number Placeholder 3">
+            <a:extLst>
+              <a:ext uri="{FF2B5EF4-FFF2-40B4-BE49-F238E27FC236}">
+                <a16:creationId xmlns:a16="http://schemas.microsoft.com/office/drawing/2014/main" id="{21969D63-F80B-4B0C-B0F1-4139229E31A1}"/>
+              </a:ext>
+            </a:extLst>
+          </p:cNvPr>
+          <p:cNvSpPr>
+            <a:spLocks noGrp="1"/>
+          </p:cNvSpPr>
+          <p:nvPr>
+            <p:ph type="sldNum" sz="quarter" idx="12"/>
+          </p:nvPr>
+        </p:nvSpPr>
+        <p:spPr/>
+        <p:txBody>
+          <a:bodyPr/>
+          <a:lstStyle/>
+          <a:p>
+            <a:fld id="{4CA37C95-3A7F-4C90-9D28-0B573484ACDD}" type="slidenum">
+              <a:rPr lang="en-US" smtClean="0"/>
+              <a:pPr/>
+              <a:t>12</a:t>
+            </a:fld>
+            <a:endParaRPr lang="en-US"/>
+          </a:p>
+        </p:txBody>
+      </p:sp>
+    </p:spTree>
+    <p:extLst>
+      <p:ext uri="{BB962C8B-B14F-4D97-AF65-F5344CB8AC3E}">
+        <p14:creationId xmlns:p14="http://schemas.microsoft.com/office/powerpoint/2010/main" val="3708811639"/>
+      </p:ext>
+    </p:extLst>
+  </p:cSld>
+  <p:clrMapOvr>
+    <a:masterClrMapping/>
+  </p:clrMapOvr>
+</p:sld>
+</file>
+
+<file path=ppt/slides/slide13.xml><?xml version="1.0" encoding="utf-8"?>
+<p:sld xmlns:a="http://schemas.openxmlformats.org/drawingml/2006/main" xmlns:r="http://schemas.openxmlformats.org/officeDocument/2006/relationships" xmlns:p="http://schemas.openxmlformats.org/presentationml/2006/main">
+  <p:cSld>
+    <p:spTree>
+      <p:nvGrpSpPr>
+        <p:cNvPr id="1" name=""/>
+        <p:cNvGrpSpPr/>
+        <p:nvPr/>
+      </p:nvGrpSpPr>
+      <p:grpSpPr>
+        <a:xfrm>
+          <a:off x="0" y="0"/>
+          <a:ext cx="0" cy="0"/>
+          <a:chOff x="0" y="0"/>
+          <a:chExt cx="0" cy="0"/>
+        </a:xfrm>
+      </p:grpSpPr>
+      <p:sp>
+        <p:nvSpPr>
           <p:cNvPr id="5" name="Title 4">
             <a:extLst>
               <a:ext uri="{FF2B5EF4-FFF2-40B4-BE49-F238E27FC236}">
@@ -21576,7 +22085,7 @@
             <a:fld id="{4CA37C95-3A7F-4C90-9D28-0B573484ACDD}" type="slidenum">
               <a:rPr lang="en-US" smtClean="0"/>
               <a:pPr/>
-              <a:t>12</a:t>
+              <a:t>13</a:t>
             </a:fld>
             <a:endParaRPr lang="en-US"/>
           </a:p>
@@ -21595,7 +22104,7 @@
 </p:sld>
 </file>
 
-<file path=ppt/slides/slide13.xml><?xml version="1.0" encoding="utf-8"?>
+<file path=ppt/slides/slide14.xml><?xml version="1.0" encoding="utf-8"?>
 <p:sld xmlns:a="http://schemas.openxmlformats.org/drawingml/2006/main" xmlns:r="http://schemas.openxmlformats.org/officeDocument/2006/relationships" xmlns:p="http://schemas.openxmlformats.org/presentationml/2006/main">
   <p:cSld>
     <p:spTree>
@@ -21667,7 +22176,7 @@
 </p:sld>
 </file>
 
-<file path=ppt/slides/slide14.xml><?xml version="1.0" encoding="utf-8"?>
+<file path=ppt/slides/slide15.xml><?xml version="1.0" encoding="utf-8"?>
 <p:sld xmlns:a="http://schemas.openxmlformats.org/drawingml/2006/main" xmlns:r="http://schemas.openxmlformats.org/officeDocument/2006/relationships" xmlns:p="http://schemas.openxmlformats.org/presentationml/2006/main">
   <p:cSld>
     <p:spTree>
@@ -21982,7 +22491,7 @@
 </p:sld>
 </file>
 
-<file path=ppt/slides/slide15.xml><?xml version="1.0" encoding="utf-8"?>
+<file path=ppt/slides/slide16.xml><?xml version="1.0" encoding="utf-8"?>
 <p:sld xmlns:a="http://schemas.openxmlformats.org/drawingml/2006/main" xmlns:r="http://schemas.openxmlformats.org/officeDocument/2006/relationships" xmlns:p="http://schemas.openxmlformats.org/presentationml/2006/main">
   <p:cSld>
     <p:spTree>
@@ -22208,7 +22717,7 @@
 </p:sld>
 </file>
 
-<file path=ppt/slides/slide16.xml><?xml version="1.0" encoding="utf-8"?>
+<file path=ppt/slides/slide17.xml><?xml version="1.0" encoding="utf-8"?>
 <p:sld xmlns:a="http://schemas.openxmlformats.org/drawingml/2006/main" xmlns:r="http://schemas.openxmlformats.org/officeDocument/2006/relationships" xmlns:p="http://schemas.openxmlformats.org/presentationml/2006/main">
   <p:cSld>
     <p:spTree>
@@ -22340,7 +22849,7 @@
             <a:fld id="{4CA37C95-3A7F-4C90-9D28-0B573484ACDD}" type="slidenum">
               <a:rPr lang="en-US" smtClean="0"/>
               <a:pPr/>
-              <a:t>16</a:t>
+              <a:t>17</a:t>
             </a:fld>
             <a:endParaRPr lang="en-US"/>
           </a:p>
@@ -22359,7 +22868,7 @@
 </p:sld>
 </file>
 
-<file path=ppt/slides/slide17.xml><?xml version="1.0" encoding="utf-8"?>
+<file path=ppt/slides/slide18.xml><?xml version="1.0" encoding="utf-8"?>
 <p:sld xmlns:a="http://schemas.openxmlformats.org/drawingml/2006/main" xmlns:r="http://schemas.openxmlformats.org/officeDocument/2006/relationships" xmlns:p="http://schemas.openxmlformats.org/presentationml/2006/main">
   <p:cSld>
     <p:spTree>
@@ -22481,7 +22990,7 @@
 </p:sld>
 </file>
 
-<file path=ppt/slides/slide18.xml><?xml version="1.0" encoding="utf-8"?>
+<file path=ppt/slides/slide19.xml><?xml version="1.0" encoding="utf-8"?>
 <p:sld xmlns:a="http://schemas.openxmlformats.org/drawingml/2006/main" xmlns:r="http://schemas.openxmlformats.org/officeDocument/2006/relationships" xmlns:p="http://schemas.openxmlformats.org/presentationml/2006/main">
   <p:cSld>
     <p:spTree>
@@ -22595,133 +23104,6 @@
 </p:sld>
 </file>
 
-<file path=ppt/slides/slide19.xml><?xml version="1.0" encoding="utf-8"?>
-<p:sld xmlns:a="http://schemas.openxmlformats.org/drawingml/2006/main" xmlns:r="http://schemas.openxmlformats.org/officeDocument/2006/relationships" xmlns:p="http://schemas.openxmlformats.org/presentationml/2006/main">
-  <p:cSld>
-    <p:spTree>
-      <p:nvGrpSpPr>
-        <p:cNvPr id="1" name=""/>
-        <p:cNvGrpSpPr/>
-        <p:nvPr/>
-      </p:nvGrpSpPr>
-      <p:grpSpPr>
-        <a:xfrm>
-          <a:off x="0" y="0"/>
-          <a:ext cx="0" cy="0"/>
-          <a:chOff x="0" y="0"/>
-          <a:chExt cx="0" cy="0"/>
-        </a:xfrm>
-      </p:grpSpPr>
-      <p:sp>
-        <p:nvSpPr>
-          <p:cNvPr id="2" name="Title 1"/>
-          <p:cNvSpPr>
-            <a:spLocks noGrp="1"/>
-          </p:cNvSpPr>
-          <p:nvPr>
-            <p:ph type="title"/>
-          </p:nvPr>
-        </p:nvSpPr>
-        <p:spPr/>
-        <p:txBody>
-          <a:bodyPr/>
-          <a:lstStyle/>
-          <a:p>
-            <a:r>
-              <a:rPr lang="en-US" dirty="0" err="1"/>
-              <a:t>Misc</a:t>
-            </a:r>
-            <a:endParaRPr lang="en-US" dirty="0"/>
-          </a:p>
-        </p:txBody>
-      </p:sp>
-      <p:sp>
-        <p:nvSpPr>
-          <p:cNvPr id="3" name="Content Placeholder 2"/>
-          <p:cNvSpPr>
-            <a:spLocks noGrp="1"/>
-          </p:cNvSpPr>
-          <p:nvPr>
-            <p:ph idx="1"/>
-          </p:nvPr>
-        </p:nvSpPr>
-        <p:spPr>
-          <a:xfrm>
-            <a:off x="390525" y="1067725"/>
-            <a:ext cx="8357616" cy="3801931"/>
-          </a:xfrm>
-        </p:spPr>
-        <p:txBody>
-          <a:bodyPr>
-            <a:normAutofit/>
-          </a:bodyPr>
-          <a:lstStyle/>
-          <a:p>
-            <a:r>
-              <a:rPr lang="en-US" dirty="0"/>
-              <a:t>Filter before </a:t>
-            </a:r>
-            <a:r>
-              <a:rPr lang="en-US" dirty="0" err="1"/>
-              <a:t>ToList</a:t>
-            </a:r>
-            <a:endParaRPr lang="en-US" dirty="0"/>
-          </a:p>
-          <a:p>
-            <a:r>
-              <a:rPr lang="en-US" dirty="0"/>
-              <a:t>Sort before Paging</a:t>
-            </a:r>
-          </a:p>
-          <a:p>
-            <a:r>
-              <a:rPr lang="en-US" dirty="0"/>
-              <a:t>Prefer</a:t>
-            </a:r>
-            <a:r>
-              <a:rPr lang="en-US" baseline="0" dirty="0"/>
-              <a:t> Any over Count&gt;0</a:t>
-            </a:r>
-          </a:p>
-          <a:p>
-            <a:r>
-              <a:rPr lang="en-US" baseline="0" dirty="0"/>
-              <a:t>Don’t Any()/Count then iterate</a:t>
-            </a:r>
-          </a:p>
-          <a:p>
-            <a:r>
-              <a:rPr lang="en-US" baseline="0" dirty="0"/>
-              <a:t>Unit of work for saves</a:t>
-            </a:r>
-          </a:p>
-          <a:p>
-            <a:r>
-              <a:rPr lang="en-US" baseline="0" dirty="0"/>
-              <a:t>Break context up with large models</a:t>
-            </a:r>
-          </a:p>
-          <a:p>
-            <a:r>
-              <a:rPr lang="en-US" dirty="0"/>
-              <a:t>Beware of type coercion/computed values</a:t>
-            </a:r>
-          </a:p>
-        </p:txBody>
-      </p:sp>
-    </p:spTree>
-    <p:extLst>
-      <p:ext uri="{BB962C8B-B14F-4D97-AF65-F5344CB8AC3E}">
-        <p14:creationId xmlns:p14="http://schemas.microsoft.com/office/powerpoint/2010/main" val="2692593048"/>
-      </p:ext>
-    </p:extLst>
-  </p:cSld>
-  <p:clrMapOvr>
-    <a:masterClrMapping/>
-  </p:clrMapOvr>
-</p:sld>
-</file>
-
 <file path=ppt/slides/slide2.xml><?xml version="1.0" encoding="utf-8"?>
 <p:sld xmlns:a="http://schemas.openxmlformats.org/drawingml/2006/main" xmlns:r="http://schemas.openxmlformats.org/officeDocument/2006/relationships" xmlns:p="http://schemas.openxmlformats.org/presentationml/2006/main">
   <p:cSld>
@@ -22823,6 +23205,133 @@
 </file>
 
 <file path=ppt/slides/slide20.xml><?xml version="1.0" encoding="utf-8"?>
+<p:sld xmlns:a="http://schemas.openxmlformats.org/drawingml/2006/main" xmlns:r="http://schemas.openxmlformats.org/officeDocument/2006/relationships" xmlns:p="http://schemas.openxmlformats.org/presentationml/2006/main">
+  <p:cSld>
+    <p:spTree>
+      <p:nvGrpSpPr>
+        <p:cNvPr id="1" name=""/>
+        <p:cNvGrpSpPr/>
+        <p:nvPr/>
+      </p:nvGrpSpPr>
+      <p:grpSpPr>
+        <a:xfrm>
+          <a:off x="0" y="0"/>
+          <a:ext cx="0" cy="0"/>
+          <a:chOff x="0" y="0"/>
+          <a:chExt cx="0" cy="0"/>
+        </a:xfrm>
+      </p:grpSpPr>
+      <p:sp>
+        <p:nvSpPr>
+          <p:cNvPr id="2" name="Title 1"/>
+          <p:cNvSpPr>
+            <a:spLocks noGrp="1"/>
+          </p:cNvSpPr>
+          <p:nvPr>
+            <p:ph type="title"/>
+          </p:nvPr>
+        </p:nvSpPr>
+        <p:spPr/>
+        <p:txBody>
+          <a:bodyPr/>
+          <a:lstStyle/>
+          <a:p>
+            <a:r>
+              <a:rPr lang="en-US" dirty="0" err="1"/>
+              <a:t>Misc</a:t>
+            </a:r>
+            <a:endParaRPr lang="en-US" dirty="0"/>
+          </a:p>
+        </p:txBody>
+      </p:sp>
+      <p:sp>
+        <p:nvSpPr>
+          <p:cNvPr id="3" name="Content Placeholder 2"/>
+          <p:cNvSpPr>
+            <a:spLocks noGrp="1"/>
+          </p:cNvSpPr>
+          <p:nvPr>
+            <p:ph idx="1"/>
+          </p:nvPr>
+        </p:nvSpPr>
+        <p:spPr>
+          <a:xfrm>
+            <a:off x="390525" y="1067725"/>
+            <a:ext cx="8357616" cy="3801931"/>
+          </a:xfrm>
+        </p:spPr>
+        <p:txBody>
+          <a:bodyPr>
+            <a:normAutofit/>
+          </a:bodyPr>
+          <a:lstStyle/>
+          <a:p>
+            <a:r>
+              <a:rPr lang="en-US" dirty="0"/>
+              <a:t>Filter before </a:t>
+            </a:r>
+            <a:r>
+              <a:rPr lang="en-US" dirty="0" err="1"/>
+              <a:t>ToList</a:t>
+            </a:r>
+            <a:endParaRPr lang="en-US" dirty="0"/>
+          </a:p>
+          <a:p>
+            <a:r>
+              <a:rPr lang="en-US" dirty="0"/>
+              <a:t>Sort before Paging</a:t>
+            </a:r>
+          </a:p>
+          <a:p>
+            <a:r>
+              <a:rPr lang="en-US" dirty="0"/>
+              <a:t>Prefer</a:t>
+            </a:r>
+            <a:r>
+              <a:rPr lang="en-US" baseline="0" dirty="0"/>
+              <a:t> Any over Count&gt;0</a:t>
+            </a:r>
+          </a:p>
+          <a:p>
+            <a:r>
+              <a:rPr lang="en-US" baseline="0" dirty="0"/>
+              <a:t>Don’t Any()/Count then iterate</a:t>
+            </a:r>
+          </a:p>
+          <a:p>
+            <a:r>
+              <a:rPr lang="en-US" baseline="0" dirty="0"/>
+              <a:t>Unit of work for saves</a:t>
+            </a:r>
+          </a:p>
+          <a:p>
+            <a:r>
+              <a:rPr lang="en-US" baseline="0" dirty="0"/>
+              <a:t>Break context up with large models</a:t>
+            </a:r>
+          </a:p>
+          <a:p>
+            <a:r>
+              <a:rPr lang="en-US" dirty="0"/>
+              <a:t>Beware of type coercion/computed values</a:t>
+            </a:r>
+          </a:p>
+        </p:txBody>
+      </p:sp>
+    </p:spTree>
+    <p:extLst>
+      <p:ext uri="{BB962C8B-B14F-4D97-AF65-F5344CB8AC3E}">
+        <p14:creationId xmlns:p14="http://schemas.microsoft.com/office/powerpoint/2010/main" val="2692593048"/>
+      </p:ext>
+    </p:extLst>
+  </p:cSld>
+  <p:clrMapOvr>
+    <a:masterClrMapping/>
+  </p:clrMapOvr>
+</p:sld>
+</file>
+
+<file path=ppt/slides/slide21.xml><?xml version="1.0" encoding="utf-8"?>
 <p:sld xmlns:a="http://schemas.openxmlformats.org/drawingml/2006/main" xmlns:r="http://schemas.openxmlformats.org/officeDocument/2006/relationships" xmlns:p="http://schemas.openxmlformats.org/presentationml/2006/main">
   <p:cSld>
     <p:spTree>
@@ -23205,7 +23714,7 @@
 </p:sld>
 </file>
 
-<file path=ppt/slides/slide21.xml><?xml version="1.0" encoding="utf-8"?>
+<file path=ppt/slides/slide22.xml><?xml version="1.0" encoding="utf-8"?>
 <p:sld xmlns:a="http://schemas.openxmlformats.org/drawingml/2006/main" xmlns:r="http://schemas.openxmlformats.org/officeDocument/2006/relationships" xmlns:p="http://schemas.openxmlformats.org/presentationml/2006/main">
   <p:cSld>
     <p:spTree>
@@ -27983,12 +28492,9 @@
 </file>
 
 <file path=customXml/item1.xml><?xml version="1.0" encoding="utf-8"?>
-<?mso-contentType ?>
-<FormTemplates xmlns="http://schemas.microsoft.com/sharepoint/v3/contenttype/forms">
-  <Display>DocumentLibraryForm</Display>
-  <Edit>DocumentLibraryForm</Edit>
-  <New>DocumentLibraryForm</New>
-</FormTemplates>
+<p:properties xmlns:p="http://schemas.microsoft.com/office/2006/metadata/properties" xmlns:xsi="http://www.w3.org/2001/XMLSchema-instance" xmlns:pc="http://schemas.microsoft.com/office/infopath/2007/PartnerControls">
+  <documentManagement/>
+</p:properties>
 </file>
 
 <file path=customXml/item2.xml><?xml version="1.0" encoding="utf-8"?>
@@ -28106,15 +28612,25 @@
 </file>
 
 <file path=customXml/item3.xml><?xml version="1.0" encoding="utf-8"?>
-<p:properties xmlns:p="http://schemas.microsoft.com/office/2006/metadata/properties" xmlns:xsi="http://www.w3.org/2001/XMLSchema-instance" xmlns:pc="http://schemas.microsoft.com/office/infopath/2007/PartnerControls">
-  <documentManagement/>
-</p:properties>
+<?mso-contentType ?>
+<FormTemplates xmlns="http://schemas.microsoft.com/sharepoint/v3/contenttype/forms">
+  <Display>DocumentLibraryForm</Display>
+  <Edit>DocumentLibraryForm</Edit>
+  <New>DocumentLibraryForm</New>
+</FormTemplates>
 </file>
 
 <file path=customXml/itemProps1.xml><?xml version="1.0" encoding="utf-8"?>
-<ds:datastoreItem xmlns:ds="http://schemas.openxmlformats.org/officeDocument/2006/customXml" ds:itemID="{34511AA7-8D46-42C1-969B-5E843ADBDC40}">
+<ds:datastoreItem xmlns:ds="http://schemas.openxmlformats.org/officeDocument/2006/customXml" ds:itemID="{310BA9E4-2DAA-49B9-9D9A-1DC7F9CCA4D9}">
   <ds:schemaRefs>
-    <ds:schemaRef ds:uri="http://schemas.microsoft.com/sharepoint/v3/contenttype/forms"/>
+    <ds:schemaRef ds:uri="http://schemas.microsoft.com/office/infopath/2007/PartnerControls"/>
+    <ds:schemaRef ds:uri="http://purl.org/dc/elements/1.1/"/>
+    <ds:schemaRef ds:uri="http://schemas.microsoft.com/office/2006/metadata/properties"/>
+    <ds:schemaRef ds:uri="http://purl.org/dc/terms/"/>
+    <ds:schemaRef ds:uri="http://schemas.openxmlformats.org/package/2006/metadata/core-properties"/>
+    <ds:schemaRef ds:uri="http://schemas.microsoft.com/office/2006/documentManagement/types"/>
+    <ds:schemaRef ds:uri="http://www.w3.org/XML/1998/namespace"/>
+    <ds:schemaRef ds:uri="http://purl.org/dc/dcmitype/"/>
   </ds:schemaRefs>
 </ds:datastoreItem>
 </file>
@@ -28136,16 +28652,9 @@
 </file>
 
 <file path=customXml/itemProps3.xml><?xml version="1.0" encoding="utf-8"?>
-<ds:datastoreItem xmlns:ds="http://schemas.openxmlformats.org/officeDocument/2006/customXml" ds:itemID="{310BA9E4-2DAA-49B9-9D9A-1DC7F9CCA4D9}">
+<ds:datastoreItem xmlns:ds="http://schemas.openxmlformats.org/officeDocument/2006/customXml" ds:itemID="{34511AA7-8D46-42C1-969B-5E843ADBDC40}">
   <ds:schemaRefs>
-    <ds:schemaRef ds:uri="http://schemas.microsoft.com/office/infopath/2007/PartnerControls"/>
-    <ds:schemaRef ds:uri="http://purl.org/dc/elements/1.1/"/>
-    <ds:schemaRef ds:uri="http://schemas.microsoft.com/office/2006/metadata/properties"/>
-    <ds:schemaRef ds:uri="http://purl.org/dc/terms/"/>
-    <ds:schemaRef ds:uri="http://schemas.openxmlformats.org/package/2006/metadata/core-properties"/>
-    <ds:schemaRef ds:uri="http://schemas.microsoft.com/office/2006/documentManagement/types"/>
-    <ds:schemaRef ds:uri="http://www.w3.org/XML/1998/namespace"/>
-    <ds:schemaRef ds:uri="http://purl.org/dc/dcmitype/"/>
+    <ds:schemaRef ds:uri="http://schemas.microsoft.com/sharepoint/v3/contenttype/forms"/>
   </ds:schemaRefs>
 </ds:datastoreItem>
 </file>
</xml_diff>

<commit_message>
Updating perf comparison chart
</commit_message>
<xml_diff>
--- a/EFPerf.pptx
+++ b/EFPerf.pptx
@@ -774,7 +774,7 @@
                 <c:formatCode>General</c:formatCode>
                 <c:ptCount val="1"/>
                 <c:pt idx="0">
-                  <c:v>753</c:v>
+                  <c:v>638</c:v>
                 </c:pt>
               </c:numCache>
             </c:numRef>
@@ -802,7 +802,7 @@
           <c:spPr>
             <a:solidFill>
               <a:schemeClr val="accent2">
-                <a:shade val="76000"/>
+                <a:shade val="65000"/>
               </a:schemeClr>
             </a:solidFill>
             <a:ln>
@@ -906,7 +906,119 @@
               <c:strCache>
                 <c:ptCount val="1"/>
                 <c:pt idx="0">
-                  <c:v>EF Core 2</c:v>
+                  <c:v>EF Core 2 AsNoTracking</c:v>
+                </c:pt>
+              </c:strCache>
+            </c:strRef>
+          </c:tx>
+          <c:spPr>
+            <a:solidFill>
+              <a:schemeClr val="accent2">
+                <a:shade val="82000"/>
+              </a:schemeClr>
+            </a:solidFill>
+            <a:ln>
+              <a:noFill/>
+            </a:ln>
+            <a:effectLst/>
+          </c:spPr>
+          <c:invertIfNegative val="0"/>
+          <c:dLbls>
+            <c:spPr>
+              <a:noFill/>
+              <a:ln>
+                <a:noFill/>
+              </a:ln>
+              <a:effectLst/>
+            </c:spPr>
+            <c:txPr>
+              <a:bodyPr rot="0" spcFirstLastPara="1" vertOverflow="ellipsis" vert="horz" wrap="square" lIns="38100" tIns="19050" rIns="38100" bIns="19050" anchor="ctr" anchorCtr="1">
+                <a:spAutoFit/>
+              </a:bodyPr>
+              <a:lstStyle/>
+              <a:p>
+                <a:pPr>
+                  <a:defRPr sz="1197" b="0" i="0" u="none" strike="noStrike" kern="1200" baseline="0">
+                    <a:solidFill>
+                      <a:schemeClr val="tx1">
+                        <a:lumMod val="75000"/>
+                        <a:lumOff val="25000"/>
+                      </a:schemeClr>
+                    </a:solidFill>
+                    <a:latin typeface="+mn-lt"/>
+                    <a:ea typeface="+mn-ea"/>
+                    <a:cs typeface="+mn-cs"/>
+                  </a:defRPr>
+                </a:pPr>
+                <a:endParaRPr lang="en-US"/>
+              </a:p>
+            </c:txPr>
+            <c:showLegendKey val="0"/>
+            <c:showVal val="1"/>
+            <c:showCatName val="0"/>
+            <c:showSerName val="0"/>
+            <c:showPercent val="0"/>
+            <c:showBubbleSize val="0"/>
+            <c:showLeaderLines val="0"/>
+            <c:extLst>
+              <c:ext xmlns:c15="http://schemas.microsoft.com/office/drawing/2012/chart" uri="{CE6537A1-D6FC-4f65-9D91-7224C49458BB}">
+                <c15:showLeaderLines val="1"/>
+                <c15:leaderLines>
+                  <c:spPr>
+                    <a:ln w="9525" cap="flat" cmpd="sng" algn="ctr">
+                      <a:solidFill>
+                        <a:schemeClr val="tx1">
+                          <a:lumMod val="35000"/>
+                          <a:lumOff val="65000"/>
+                        </a:schemeClr>
+                      </a:solidFill>
+                      <a:round/>
+                    </a:ln>
+                    <a:effectLst/>
+                  </c:spPr>
+                </c15:leaderLines>
+              </c:ext>
+            </c:extLst>
+          </c:dLbls>
+          <c:cat>
+            <c:strRef>
+              <c:f>Sheet1!$A$2</c:f>
+              <c:strCache>
+                <c:ptCount val="1"/>
+                <c:pt idx="0">
+                  <c:v>Category 1</c:v>
+                </c:pt>
+              </c:strCache>
+            </c:strRef>
+          </c:cat>
+          <c:val>
+            <c:numRef>
+              <c:f>Sheet1!$D$2</c:f>
+              <c:numCache>
+                <c:formatCode>General</c:formatCode>
+                <c:ptCount val="1"/>
+                <c:pt idx="0">
+                  <c:v>180</c:v>
+                </c:pt>
+              </c:numCache>
+            </c:numRef>
+          </c:val>
+          <c:extLst>
+            <c:ext xmlns:c16="http://schemas.microsoft.com/office/drawing/2014/chart" uri="{C3380CC4-5D6E-409C-BE32-E72D297353CC}">
+              <c16:uniqueId val="{00000004-8B71-4019-ADD2-9F9C1F7B898D}"/>
+            </c:ext>
+          </c:extLst>
+        </c:ser>
+        <c:ser>
+          <c:idx val="3"/>
+          <c:order val="3"/>
+          <c:tx>
+            <c:strRef>
+              <c:f>Sheet1!$E$1</c:f>
+              <c:strCache>
+                <c:ptCount val="1"/>
+                <c:pt idx="0">
+                  <c:v>Dapper</c:v>
                 </c:pt>
               </c:strCache>
             </c:strRef>
@@ -991,124 +1103,12 @@
           </c:cat>
           <c:val>
             <c:numRef>
-              <c:f>Sheet1!$D$2</c:f>
-              <c:numCache>
-                <c:formatCode>General</c:formatCode>
-                <c:ptCount val="1"/>
-                <c:pt idx="0">
-                  <c:v>196</c:v>
-                </c:pt>
-              </c:numCache>
-            </c:numRef>
-          </c:val>
-          <c:extLst>
-            <c:ext xmlns:c16="http://schemas.microsoft.com/office/drawing/2014/chart" uri="{C3380CC4-5D6E-409C-BE32-E72D297353CC}">
-              <c16:uniqueId val="{00000004-8B71-4019-ADD2-9F9C1F7B898D}"/>
-            </c:ext>
-          </c:extLst>
-        </c:ser>
-        <c:ser>
-          <c:idx val="3"/>
-          <c:order val="3"/>
-          <c:tx>
-            <c:strRef>
-              <c:f>Sheet1!$E$1</c:f>
-              <c:strCache>
-                <c:ptCount val="1"/>
-                <c:pt idx="0">
-                  <c:v>EF Core 2 AsNoTracking</c:v>
-                </c:pt>
-              </c:strCache>
-            </c:strRef>
-          </c:tx>
-          <c:spPr>
-            <a:solidFill>
-              <a:schemeClr val="accent2">
-                <a:tint val="77000"/>
-              </a:schemeClr>
-            </a:solidFill>
-            <a:ln>
-              <a:noFill/>
-            </a:ln>
-            <a:effectLst/>
-          </c:spPr>
-          <c:invertIfNegative val="0"/>
-          <c:dLbls>
-            <c:spPr>
-              <a:noFill/>
-              <a:ln>
-                <a:noFill/>
-              </a:ln>
-              <a:effectLst/>
-            </c:spPr>
-            <c:txPr>
-              <a:bodyPr rot="0" spcFirstLastPara="1" vertOverflow="ellipsis" vert="horz" wrap="square" lIns="38100" tIns="19050" rIns="38100" bIns="19050" anchor="ctr" anchorCtr="1">
-                <a:spAutoFit/>
-              </a:bodyPr>
-              <a:lstStyle/>
-              <a:p>
-                <a:pPr>
-                  <a:defRPr sz="1197" b="0" i="0" u="none" strike="noStrike" kern="1200" baseline="0">
-                    <a:solidFill>
-                      <a:schemeClr val="tx1">
-                        <a:lumMod val="75000"/>
-                        <a:lumOff val="25000"/>
-                      </a:schemeClr>
-                    </a:solidFill>
-                    <a:latin typeface="+mn-lt"/>
-                    <a:ea typeface="+mn-ea"/>
-                    <a:cs typeface="+mn-cs"/>
-                  </a:defRPr>
-                </a:pPr>
-                <a:endParaRPr lang="en-US"/>
-              </a:p>
-            </c:txPr>
-            <c:showLegendKey val="0"/>
-            <c:showVal val="1"/>
-            <c:showCatName val="0"/>
-            <c:showSerName val="0"/>
-            <c:showPercent val="0"/>
-            <c:showBubbleSize val="0"/>
-            <c:showLeaderLines val="0"/>
-            <c:extLst>
-              <c:ext xmlns:c15="http://schemas.microsoft.com/office/drawing/2012/chart" uri="{CE6537A1-D6FC-4f65-9D91-7224C49458BB}">
-                <c15:showLeaderLines val="1"/>
-                <c15:leaderLines>
-                  <c:spPr>
-                    <a:ln w="9525" cap="flat" cmpd="sng" algn="ctr">
-                      <a:solidFill>
-                        <a:schemeClr val="tx1">
-                          <a:lumMod val="35000"/>
-                          <a:lumOff val="65000"/>
-                        </a:schemeClr>
-                      </a:solidFill>
-                      <a:round/>
-                    </a:ln>
-                    <a:effectLst/>
-                  </c:spPr>
-                </c15:leaderLines>
-              </c:ext>
-            </c:extLst>
-          </c:dLbls>
-          <c:cat>
-            <c:strRef>
-              <c:f>Sheet1!$A$2</c:f>
-              <c:strCache>
-                <c:ptCount val="1"/>
-                <c:pt idx="0">
-                  <c:v>Category 1</c:v>
-                </c:pt>
-              </c:strCache>
-            </c:strRef>
-          </c:cat>
-          <c:val>
-            <c:numRef>
               <c:f>Sheet1!$E$2</c:f>
               <c:numCache>
                 <c:formatCode>General</c:formatCode>
                 <c:ptCount val="1"/>
                 <c:pt idx="0">
-                  <c:v>115</c:v>
+                  <c:v>151</c:v>
                 </c:pt>
               </c:numCache>
             </c:numRef>
@@ -1128,7 +1128,7 @@
               <c:strCache>
                 <c:ptCount val="1"/>
                 <c:pt idx="0">
-                  <c:v>Dapper</c:v>
+                  <c:v>EFCore 5</c:v>
                 </c:pt>
               </c:strCache>
             </c:strRef>
@@ -1221,7 +1221,7 @@
                 <c:formatCode>General</c:formatCode>
                 <c:ptCount val="1"/>
                 <c:pt idx="0">
-                  <c:v>99.8</c:v>
+                  <c:v>135</c:v>
                 </c:pt>
               </c:numCache>
             </c:numRef>
@@ -1229,6 +1229,230 @@
           <c:extLst>
             <c:ext xmlns:c16="http://schemas.microsoft.com/office/drawing/2014/chart" uri="{C3380CC4-5D6E-409C-BE32-E72D297353CC}">
               <c16:uniqueId val="{00000006-8B71-4019-ADD2-9F9C1F7B898D}"/>
+            </c:ext>
+          </c:extLst>
+        </c:ser>
+        <c:ser>
+          <c:idx val="5"/>
+          <c:order val="5"/>
+          <c:tx>
+            <c:strRef>
+              <c:f>Sheet1!$G$1</c:f>
+              <c:strCache>
+                <c:ptCount val="1"/>
+                <c:pt idx="0">
+                  <c:v>EF Core 6</c:v>
+                </c:pt>
+              </c:strCache>
+            </c:strRef>
+          </c:tx>
+          <c:spPr>
+            <a:solidFill>
+              <a:schemeClr val="accent2">
+                <a:tint val="65000"/>
+              </a:schemeClr>
+            </a:solidFill>
+            <a:ln>
+              <a:noFill/>
+            </a:ln>
+            <a:effectLst/>
+          </c:spPr>
+          <c:invertIfNegative val="0"/>
+          <c:dLbls>
+            <c:spPr>
+              <a:noFill/>
+              <a:ln>
+                <a:noFill/>
+              </a:ln>
+              <a:effectLst/>
+            </c:spPr>
+            <c:txPr>
+              <a:bodyPr rot="0" spcFirstLastPara="1" vertOverflow="ellipsis" vert="horz" wrap="square" lIns="38100" tIns="19050" rIns="38100" bIns="19050" anchor="ctr" anchorCtr="1">
+                <a:spAutoFit/>
+              </a:bodyPr>
+              <a:lstStyle/>
+              <a:p>
+                <a:pPr>
+                  <a:defRPr sz="1197" b="0" i="0" u="none" strike="noStrike" kern="1200" baseline="0">
+                    <a:solidFill>
+                      <a:schemeClr val="tx1">
+                        <a:lumMod val="75000"/>
+                        <a:lumOff val="25000"/>
+                      </a:schemeClr>
+                    </a:solidFill>
+                    <a:latin typeface="+mn-lt"/>
+                    <a:ea typeface="+mn-ea"/>
+                    <a:cs typeface="+mn-cs"/>
+                  </a:defRPr>
+                </a:pPr>
+                <a:endParaRPr lang="en-US"/>
+              </a:p>
+            </c:txPr>
+            <c:showLegendKey val="0"/>
+            <c:showVal val="1"/>
+            <c:showCatName val="0"/>
+            <c:showSerName val="0"/>
+            <c:showPercent val="0"/>
+            <c:showBubbleSize val="0"/>
+            <c:showLeaderLines val="0"/>
+            <c:extLst>
+              <c:ext xmlns:c15="http://schemas.microsoft.com/office/drawing/2012/chart" uri="{CE6537A1-D6FC-4f65-9D91-7224C49458BB}">
+                <c15:showLeaderLines val="1"/>
+                <c15:leaderLines>
+                  <c:spPr>
+                    <a:ln w="9525" cap="flat" cmpd="sng" algn="ctr">
+                      <a:solidFill>
+                        <a:schemeClr val="tx1">
+                          <a:lumMod val="35000"/>
+                          <a:lumOff val="65000"/>
+                        </a:schemeClr>
+                      </a:solidFill>
+                      <a:round/>
+                    </a:ln>
+                    <a:effectLst/>
+                  </c:spPr>
+                </c15:leaderLines>
+              </c:ext>
+            </c:extLst>
+          </c:dLbls>
+          <c:cat>
+            <c:strRef>
+              <c:f>Sheet1!$A$2</c:f>
+              <c:strCache>
+                <c:ptCount val="1"/>
+                <c:pt idx="0">
+                  <c:v>Category 1</c:v>
+                </c:pt>
+              </c:strCache>
+            </c:strRef>
+          </c:cat>
+          <c:val>
+            <c:numRef>
+              <c:f>Sheet1!$G$2</c:f>
+              <c:numCache>
+                <c:formatCode>General</c:formatCode>
+                <c:ptCount val="1"/>
+                <c:pt idx="0">
+                  <c:v>124</c:v>
+                </c:pt>
+              </c:numCache>
+            </c:numRef>
+          </c:val>
+          <c:extLst>
+            <c:ext xmlns:c16="http://schemas.microsoft.com/office/drawing/2014/chart" uri="{C3380CC4-5D6E-409C-BE32-E72D297353CC}">
+              <c16:uniqueId val="{00000001-F1CE-48C3-AA3E-6C416F72D9DD}"/>
+            </c:ext>
+          </c:extLst>
+        </c:ser>
+        <c:ser>
+          <c:idx val="6"/>
+          <c:order val="6"/>
+          <c:tx>
+            <c:strRef>
+              <c:f>Sheet1!$H$1</c:f>
+              <c:strCache>
+                <c:ptCount val="1"/>
+                <c:pt idx="0">
+                  <c:v>Dapper 6 </c:v>
+                </c:pt>
+              </c:strCache>
+            </c:strRef>
+          </c:tx>
+          <c:spPr>
+            <a:solidFill>
+              <a:schemeClr val="accent2">
+                <a:tint val="48000"/>
+              </a:schemeClr>
+            </a:solidFill>
+            <a:ln>
+              <a:noFill/>
+            </a:ln>
+            <a:effectLst/>
+          </c:spPr>
+          <c:invertIfNegative val="0"/>
+          <c:dLbls>
+            <c:spPr>
+              <a:noFill/>
+              <a:ln>
+                <a:noFill/>
+              </a:ln>
+              <a:effectLst/>
+            </c:spPr>
+            <c:txPr>
+              <a:bodyPr rot="0" spcFirstLastPara="1" vertOverflow="ellipsis" vert="horz" wrap="square" lIns="38100" tIns="19050" rIns="38100" bIns="19050" anchor="ctr" anchorCtr="1">
+                <a:spAutoFit/>
+              </a:bodyPr>
+              <a:lstStyle/>
+              <a:p>
+                <a:pPr>
+                  <a:defRPr sz="1197" b="0" i="0" u="none" strike="noStrike" kern="1200" baseline="0">
+                    <a:solidFill>
+                      <a:schemeClr val="tx1">
+                        <a:lumMod val="75000"/>
+                        <a:lumOff val="25000"/>
+                      </a:schemeClr>
+                    </a:solidFill>
+                    <a:latin typeface="+mn-lt"/>
+                    <a:ea typeface="+mn-ea"/>
+                    <a:cs typeface="+mn-cs"/>
+                  </a:defRPr>
+                </a:pPr>
+                <a:endParaRPr lang="en-US"/>
+              </a:p>
+            </c:txPr>
+            <c:showLegendKey val="0"/>
+            <c:showVal val="1"/>
+            <c:showCatName val="0"/>
+            <c:showSerName val="0"/>
+            <c:showPercent val="0"/>
+            <c:showBubbleSize val="0"/>
+            <c:showLeaderLines val="0"/>
+            <c:extLst>
+              <c:ext xmlns:c15="http://schemas.microsoft.com/office/drawing/2012/chart" uri="{CE6537A1-D6FC-4f65-9D91-7224C49458BB}">
+                <c15:showLeaderLines val="1"/>
+                <c15:leaderLines>
+                  <c:spPr>
+                    <a:ln w="9525" cap="flat" cmpd="sng" algn="ctr">
+                      <a:solidFill>
+                        <a:schemeClr val="tx1">
+                          <a:lumMod val="35000"/>
+                          <a:lumOff val="65000"/>
+                        </a:schemeClr>
+                      </a:solidFill>
+                      <a:round/>
+                    </a:ln>
+                    <a:effectLst/>
+                  </c:spPr>
+                </c15:leaderLines>
+              </c:ext>
+            </c:extLst>
+          </c:dLbls>
+          <c:cat>
+            <c:strRef>
+              <c:f>Sheet1!$A$2</c:f>
+              <c:strCache>
+                <c:ptCount val="1"/>
+                <c:pt idx="0">
+                  <c:v>Category 1</c:v>
+                </c:pt>
+              </c:strCache>
+            </c:strRef>
+          </c:cat>
+          <c:val>
+            <c:numRef>
+              <c:f>Sheet1!$H$2</c:f>
+              <c:numCache>
+                <c:formatCode>General</c:formatCode>
+                <c:ptCount val="1"/>
+                <c:pt idx="0">
+                  <c:v>113</c:v>
+                </c:pt>
+              </c:numCache>
+            </c:numRef>
+          </c:val>
+          <c:extLst>
+            <c:ext xmlns:c16="http://schemas.microsoft.com/office/drawing/2014/chart" uri="{C3380CC4-5D6E-409C-BE32-E72D297353CC}">
+              <c16:uniqueId val="{00000002-F1CE-48C3-AA3E-6C416F72D9DD}"/>
             </c:ext>
           </c:extLst>
         </c:ser>
@@ -10075,7 +10299,7 @@
           <a:p>
             <a:fld id="{7B6A12C6-64DF-430F-A4DC-0FC62ED5BE2B}" type="datetime1">
               <a:rPr lang="en-US" smtClean="0"/>
-              <a:t>6/20/2021</a:t>
+              <a:t>6/21/2021</a:t>
             </a:fld>
             <a:endParaRPr lang="en-US" dirty="0"/>
           </a:p>
@@ -10241,7 +10465,7 @@
           <a:p>
             <a:fld id="{8209028B-9E3C-481D-8F79-63DDE9F2EC79}" type="datetime1">
               <a:rPr lang="en-US" smtClean="0"/>
-              <a:t>6/20/2021</a:t>
+              <a:t>6/21/2021</a:t>
             </a:fld>
             <a:endParaRPr lang="en-US" dirty="0"/>
           </a:p>
@@ -12285,7 +12509,7 @@
           <a:p>
             <a:fld id="{CB293217-2C1A-4AAE-948E-700BCDD5810A}" type="datetimeFigureOut">
               <a:rPr lang="en-US" smtClean="0"/>
-              <a:t>6/20/2021</a:t>
+              <a:t>6/21/2021</a:t>
             </a:fld>
             <a:endParaRPr lang="en-US"/>
           </a:p>
@@ -12480,7 +12704,7 @@
           <a:p>
             <a:fld id="{CB293217-2C1A-4AAE-948E-700BCDD5810A}" type="datetimeFigureOut">
               <a:rPr lang="en-US" smtClean="0"/>
-              <a:t>6/20/2021</a:t>
+              <a:t>6/21/2021</a:t>
             </a:fld>
             <a:endParaRPr lang="en-US"/>
           </a:p>
@@ -19826,7 +20050,7 @@
             </a:pPr>
             <a:r>
               <a:rPr lang="en-US" sz="1200" dirty="0"/>
-              <a:t>Solution Architect, Slalom</a:t>
+              <a:t>Senior Delivery Principal, Slalom</a:t>
             </a:r>
           </a:p>
           <a:p>
@@ -19988,7 +20212,7 @@
         </p:spPr>
         <p:txBody>
           <a:bodyPr>
-            <a:normAutofit lnSpcReduction="10000"/>
+            <a:normAutofit fontScale="92500" lnSpcReduction="20000"/>
           </a:bodyPr>
           <a:lstStyle/>
           <a:p>
@@ -20037,6 +20261,12 @@
               <a:t>MiniProfiler</a:t>
             </a:r>
             <a:endParaRPr lang="en-US" dirty="0"/>
+          </a:p>
+          <a:p>
+            <a:r>
+              <a:rPr lang="en-US" dirty="0"/>
+              <a:t>Azure Data Studio</a:t>
+            </a:r>
           </a:p>
         </p:txBody>
       </p:sp>
@@ -20749,7 +20979,7 @@
         <p:spPr>
           <a:xfrm>
             <a:off x="0" y="95964"/>
-            <a:ext cx="9935733" cy="5078313"/>
+            <a:ext cx="9049272" cy="4524315"/>
           </a:xfrm>
           <a:prstGeom prst="rect">
             <a:avLst/>
@@ -20765,7 +20995,9 @@
           <a:lstStyle/>
           <a:p>
             <a:r>
-              <a:rPr lang="en-US" sz="1600" dirty="0"/>
+              <a:rPr lang="en-US" sz="1600" dirty="0">
+                <a:latin typeface="Consolas" panose="020B0609020204030204" pitchFamily="49" charset="0"/>
+              </a:rPr>
               <a:t>Logging in Core 3:</a:t>
             </a:r>
           </a:p>
@@ -21052,10 +21284,17 @@
                 </a:solidFill>
                 <a:latin typeface="Consolas" panose="020B0609020204030204" pitchFamily="49" charset="0"/>
               </a:rPr>
-              <a:t> {</a:t>
-            </a:r>
-          </a:p>
-          <a:p>
+              <a:t> 	=&gt; </a:t>
+            </a:r>
+            <a:r>
+              <a:rPr lang="en-US" sz="1600" dirty="0" err="1">
+                <a:solidFill>
+                  <a:srgbClr val="000000"/>
+                </a:solidFill>
+                <a:latin typeface="Consolas" panose="020B0609020204030204" pitchFamily="49" charset="0"/>
+              </a:rPr>
+              <a:t>optionsBuilder.UseLoggerFactory</a:t>
+            </a:r>
             <a:r>
               <a:rPr lang="en-US" sz="1600" dirty="0">
                 <a:solidFill>
@@ -21063,7 +21302,160 @@
                 </a:solidFill>
                 <a:latin typeface="Consolas" panose="020B0609020204030204" pitchFamily="49" charset="0"/>
               </a:rPr>
-              <a:t>     </a:t>
+              <a:t>(</a:t>
+            </a:r>
+            <a:r>
+              <a:rPr lang="en-US" sz="1600" dirty="0" err="1">
+                <a:solidFill>
+                  <a:srgbClr val="000000"/>
+                </a:solidFill>
+                <a:latin typeface="Consolas" panose="020B0609020204030204" pitchFamily="49" charset="0"/>
+              </a:rPr>
+              <a:t>ContextLoggerFactory</a:t>
+            </a:r>
+            <a:r>
+              <a:rPr lang="en-US" sz="1600" dirty="0">
+                <a:solidFill>
+                  <a:srgbClr val="000000"/>
+                </a:solidFill>
+                <a:latin typeface="Consolas" panose="020B0609020204030204" pitchFamily="49" charset="0"/>
+              </a:rPr>
+              <a:t>);</a:t>
+            </a:r>
+          </a:p>
+          <a:p>
+            <a:endParaRPr lang="en-US" sz="1600" dirty="0">
+              <a:solidFill>
+                <a:srgbClr val="000000"/>
+              </a:solidFill>
+              <a:latin typeface="Consolas" panose="020B0609020204030204" pitchFamily="49" charset="0"/>
+            </a:endParaRPr>
+          </a:p>
+          <a:p>
+            <a:endParaRPr lang="en-US" sz="1600" dirty="0">
+              <a:solidFill>
+                <a:srgbClr val="000000"/>
+              </a:solidFill>
+              <a:latin typeface="Consolas" panose="020B0609020204030204" pitchFamily="49" charset="0"/>
+            </a:endParaRPr>
+          </a:p>
+          <a:p>
+            <a:endParaRPr lang="en-US" sz="1600" dirty="0">
+              <a:solidFill>
+                <a:srgbClr val="000000"/>
+              </a:solidFill>
+              <a:latin typeface="Consolas" panose="020B0609020204030204" pitchFamily="49" charset="0"/>
+            </a:endParaRPr>
+          </a:p>
+          <a:p>
+            <a:endParaRPr lang="en-US" sz="1600" dirty="0">
+              <a:solidFill>
+                <a:srgbClr val="000000"/>
+              </a:solidFill>
+              <a:latin typeface="Consolas" panose="020B0609020204030204" pitchFamily="49" charset="0"/>
+            </a:endParaRPr>
+          </a:p>
+          <a:p>
+            <a:r>
+              <a:rPr lang="en-US" sz="1600" dirty="0">
+                <a:solidFill>
+                  <a:srgbClr val="000000"/>
+                </a:solidFill>
+                <a:latin typeface="Consolas" panose="020B0609020204030204" pitchFamily="49" charset="0"/>
+              </a:rPr>
+              <a:t>Core 5:</a:t>
+            </a:r>
+          </a:p>
+          <a:p>
+            <a:r>
+              <a:rPr lang="en-US" sz="1600" dirty="0">
+                <a:solidFill>
+                  <a:srgbClr val="0000FF"/>
+                </a:solidFill>
+                <a:latin typeface="Consolas" panose="020B0609020204030204" pitchFamily="49" charset="0"/>
+              </a:rPr>
+              <a:t> protected</a:t>
+            </a:r>
+            <a:r>
+              <a:rPr lang="en-US" sz="1600" dirty="0">
+                <a:solidFill>
+                  <a:srgbClr val="000000"/>
+                </a:solidFill>
+                <a:latin typeface="Consolas" panose="020B0609020204030204" pitchFamily="49" charset="0"/>
+              </a:rPr>
+              <a:t> </a:t>
+            </a:r>
+            <a:r>
+              <a:rPr lang="en-US" sz="1600" dirty="0">
+                <a:solidFill>
+                  <a:srgbClr val="0000FF"/>
+                </a:solidFill>
+                <a:latin typeface="Consolas" panose="020B0609020204030204" pitchFamily="49" charset="0"/>
+              </a:rPr>
+              <a:t>override</a:t>
+            </a:r>
+            <a:r>
+              <a:rPr lang="en-US" sz="1600" dirty="0">
+                <a:solidFill>
+                  <a:srgbClr val="000000"/>
+                </a:solidFill>
+                <a:latin typeface="Consolas" panose="020B0609020204030204" pitchFamily="49" charset="0"/>
+              </a:rPr>
+              <a:t> </a:t>
+            </a:r>
+            <a:r>
+              <a:rPr lang="en-US" sz="1600" dirty="0">
+                <a:solidFill>
+                  <a:srgbClr val="0000FF"/>
+                </a:solidFill>
+                <a:latin typeface="Consolas" panose="020B0609020204030204" pitchFamily="49" charset="0"/>
+              </a:rPr>
+              <a:t>void</a:t>
+            </a:r>
+            <a:r>
+              <a:rPr lang="en-US" sz="1600" dirty="0">
+                <a:solidFill>
+                  <a:srgbClr val="000000"/>
+                </a:solidFill>
+                <a:latin typeface="Consolas" panose="020B0609020204030204" pitchFamily="49" charset="0"/>
+              </a:rPr>
+              <a:t> </a:t>
+            </a:r>
+            <a:r>
+              <a:rPr lang="en-US" sz="1600" dirty="0" err="1">
+                <a:solidFill>
+                  <a:srgbClr val="000000"/>
+                </a:solidFill>
+                <a:latin typeface="Consolas" panose="020B0609020204030204" pitchFamily="49" charset="0"/>
+              </a:rPr>
+              <a:t>OnConfiguring</a:t>
+            </a:r>
+            <a:r>
+              <a:rPr lang="en-US" sz="1600" dirty="0">
+                <a:solidFill>
+                  <a:srgbClr val="000000"/>
+                </a:solidFill>
+                <a:latin typeface="Consolas" panose="020B0609020204030204" pitchFamily="49" charset="0"/>
+              </a:rPr>
+              <a:t>(</a:t>
+            </a:r>
+            <a:r>
+              <a:rPr lang="en-US" sz="1600" dirty="0" err="1">
+                <a:solidFill>
+                  <a:srgbClr val="000000"/>
+                </a:solidFill>
+                <a:latin typeface="Consolas" panose="020B0609020204030204" pitchFamily="49" charset="0"/>
+              </a:rPr>
+              <a:t>DbContextOptionsBuilder</a:t>
+            </a:r>
+            <a:r>
+              <a:rPr lang="en-US" sz="1600" dirty="0">
+                <a:solidFill>
+                  <a:srgbClr val="000000"/>
+                </a:solidFill>
+                <a:latin typeface="Consolas" panose="020B0609020204030204" pitchFamily="49" charset="0"/>
+              </a:rPr>
+              <a:t> </a:t>
             </a:r>
             <a:r>
               <a:rPr lang="en-US" sz="1600" dirty="0" err="1">
@@ -21074,14 +21466,6 @@
               </a:rPr>
               <a:t>optionsBuilder</a:t>
             </a:r>
-            <a:endParaRPr lang="en-US" sz="1600" dirty="0">
-              <a:solidFill>
-                <a:srgbClr val="000000"/>
-              </a:solidFill>
-              <a:latin typeface="Consolas" panose="020B0609020204030204" pitchFamily="49" charset="0"/>
-            </a:endParaRPr>
-          </a:p>
-          <a:p>
             <a:r>
               <a:rPr lang="en-US" sz="1600" dirty="0">
                 <a:solidFill>
@@ -21089,237 +21473,45 @@
                 </a:solidFill>
                 <a:latin typeface="Consolas" panose="020B0609020204030204" pitchFamily="49" charset="0"/>
               </a:rPr>
-              <a:t>        .</a:t>
-            </a:r>
-            <a:r>
-              <a:rPr lang="en-US" sz="1600" dirty="0" err="1">
-                <a:solidFill>
-                  <a:srgbClr val="000000"/>
-                </a:solidFill>
+              <a:t>)</a:t>
+            </a:r>
+          </a:p>
+          <a:p>
+            <a:r>
+              <a:rPr lang="en-US" sz="1600" dirty="0"/>
+              <a:t>	 </a:t>
+            </a:r>
+            <a:r>
+              <a:rPr lang="en-US" sz="1600" dirty="0">
                 <a:latin typeface="Consolas" panose="020B0609020204030204" pitchFamily="49" charset="0"/>
               </a:rPr>
-              <a:t>UseLoggerFactory</a:t>
+              <a:t>=&gt; </a:t>
+            </a:r>
+            <a:r>
+              <a:rPr lang="en-US" sz="1600" dirty="0" err="1">
+                <a:latin typeface="Consolas" panose="020B0609020204030204" pitchFamily="49" charset="0"/>
+              </a:rPr>
+              <a:t>optionsBuilder.LogTo</a:t>
             </a:r>
             <a:r>
               <a:rPr lang="en-US" sz="1600" dirty="0">
-                <a:solidFill>
-                  <a:srgbClr val="000000"/>
-                </a:solidFill>
                 <a:latin typeface="Consolas" panose="020B0609020204030204" pitchFamily="49" charset="0"/>
               </a:rPr>
               <a:t>(</a:t>
             </a:r>
             <a:r>
               <a:rPr lang="en-US" sz="1600" dirty="0" err="1">
-                <a:solidFill>
-                  <a:srgbClr val="000000"/>
-                </a:solidFill>
                 <a:latin typeface="Consolas" panose="020B0609020204030204" pitchFamily="49" charset="0"/>
               </a:rPr>
-              <a:t>ContextLoggerFactory</a:t>
+              <a:t>Console.WriteLine</a:t>
             </a:r>
             <a:r>
               <a:rPr lang="en-US" sz="1600" dirty="0">
-                <a:solidFill>
-                  <a:srgbClr val="000000"/>
-                </a:solidFill>
                 <a:latin typeface="Consolas" panose="020B0609020204030204" pitchFamily="49" charset="0"/>
               </a:rPr>
               <a:t>);</a:t>
             </a:r>
-          </a:p>
-          <a:p>
-            <a:r>
-              <a:rPr lang="en-US" sz="1600" dirty="0">
-                <a:solidFill>
-                  <a:srgbClr val="000000"/>
-                </a:solidFill>
-                <a:latin typeface="Consolas" panose="020B0609020204030204" pitchFamily="49" charset="0"/>
-              </a:rPr>
-              <a:t> }</a:t>
-            </a:r>
-          </a:p>
-          <a:p>
             <a:endParaRPr lang="en-US" sz="1600" dirty="0">
-              <a:solidFill>
-                <a:srgbClr val="000000"/>
-              </a:solidFill>
-              <a:latin typeface="Consolas" panose="020B0609020204030204" pitchFamily="49" charset="0"/>
-            </a:endParaRPr>
-          </a:p>
-          <a:p>
-            <a:endParaRPr lang="en-US" sz="1600" dirty="0">
-              <a:solidFill>
-                <a:srgbClr val="000000"/>
-              </a:solidFill>
-              <a:latin typeface="Consolas" panose="020B0609020204030204" pitchFamily="49" charset="0"/>
-            </a:endParaRPr>
-          </a:p>
-          <a:p>
-            <a:endParaRPr lang="en-US" sz="1600" dirty="0">
-              <a:solidFill>
-                <a:srgbClr val="000000"/>
-              </a:solidFill>
-              <a:latin typeface="Consolas" panose="020B0609020204030204" pitchFamily="49" charset="0"/>
-            </a:endParaRPr>
-          </a:p>
-          <a:p>
-            <a:r>
-              <a:rPr lang="en-US" sz="1600" dirty="0">
-                <a:solidFill>
-                  <a:srgbClr val="000000"/>
-                </a:solidFill>
-                <a:latin typeface="Consolas" panose="020B0609020204030204" pitchFamily="49" charset="0"/>
-              </a:rPr>
-              <a:t>Core 5:</a:t>
-            </a:r>
-          </a:p>
-          <a:p>
-            <a:r>
-              <a:rPr lang="en-US" dirty="0">
-                <a:solidFill>
-                  <a:srgbClr val="0000FF"/>
-                </a:solidFill>
-                <a:latin typeface="Consolas" panose="020B0609020204030204" pitchFamily="49" charset="0"/>
-              </a:rPr>
-              <a:t>protected</a:t>
-            </a:r>
-            <a:r>
-              <a:rPr lang="en-US" dirty="0">
-                <a:solidFill>
-                  <a:srgbClr val="000000"/>
-                </a:solidFill>
-                <a:latin typeface="Consolas" panose="020B0609020204030204" pitchFamily="49" charset="0"/>
-              </a:rPr>
-              <a:t> </a:t>
-            </a:r>
-            <a:r>
-              <a:rPr lang="en-US" dirty="0">
-                <a:solidFill>
-                  <a:srgbClr val="0000FF"/>
-                </a:solidFill>
-                <a:latin typeface="Consolas" panose="020B0609020204030204" pitchFamily="49" charset="0"/>
-              </a:rPr>
-              <a:t>override</a:t>
-            </a:r>
-            <a:r>
-              <a:rPr lang="en-US" dirty="0">
-                <a:solidFill>
-                  <a:srgbClr val="000000"/>
-                </a:solidFill>
-                <a:latin typeface="Consolas" panose="020B0609020204030204" pitchFamily="49" charset="0"/>
-              </a:rPr>
-              <a:t> </a:t>
-            </a:r>
-            <a:r>
-              <a:rPr lang="en-US" dirty="0">
-                <a:solidFill>
-                  <a:srgbClr val="0000FF"/>
-                </a:solidFill>
-                <a:latin typeface="Consolas" panose="020B0609020204030204" pitchFamily="49" charset="0"/>
-              </a:rPr>
-              <a:t>void</a:t>
-            </a:r>
-            <a:r>
-              <a:rPr lang="en-US" dirty="0">
-                <a:solidFill>
-                  <a:srgbClr val="000000"/>
-                </a:solidFill>
-                <a:latin typeface="Consolas" panose="020B0609020204030204" pitchFamily="49" charset="0"/>
-              </a:rPr>
-              <a:t> </a:t>
-            </a:r>
-            <a:r>
-              <a:rPr lang="en-US" dirty="0" err="1">
-                <a:solidFill>
-                  <a:srgbClr val="000000"/>
-                </a:solidFill>
-                <a:latin typeface="Consolas" panose="020B0609020204030204" pitchFamily="49" charset="0"/>
-              </a:rPr>
-              <a:t>OnConfiguring</a:t>
-            </a:r>
-            <a:r>
-              <a:rPr lang="en-US" dirty="0">
-                <a:solidFill>
-                  <a:srgbClr val="000000"/>
-                </a:solidFill>
-                <a:latin typeface="Consolas" panose="020B0609020204030204" pitchFamily="49" charset="0"/>
-              </a:rPr>
-              <a:t>(</a:t>
-            </a:r>
-            <a:r>
-              <a:rPr lang="en-US" dirty="0" err="1">
-                <a:solidFill>
-                  <a:srgbClr val="000000"/>
-                </a:solidFill>
-                <a:latin typeface="Consolas" panose="020B0609020204030204" pitchFamily="49" charset="0"/>
-              </a:rPr>
-              <a:t>DbContextOptionsBuilder</a:t>
-            </a:r>
-            <a:r>
-              <a:rPr lang="en-US" dirty="0">
-                <a:solidFill>
-                  <a:srgbClr val="000000"/>
-                </a:solidFill>
-                <a:latin typeface="Consolas" panose="020B0609020204030204" pitchFamily="49" charset="0"/>
-              </a:rPr>
-              <a:t> </a:t>
-            </a:r>
-            <a:r>
-              <a:rPr lang="en-US" dirty="0" err="1">
-                <a:solidFill>
-                  <a:srgbClr val="000000"/>
-                </a:solidFill>
-                <a:latin typeface="Consolas" panose="020B0609020204030204" pitchFamily="49" charset="0"/>
-              </a:rPr>
-              <a:t>optionsBuilder</a:t>
-            </a:r>
-            <a:r>
-              <a:rPr lang="en-US" dirty="0">
-                <a:solidFill>
-                  <a:srgbClr val="000000"/>
-                </a:solidFill>
-                <a:latin typeface="Consolas" panose="020B0609020204030204" pitchFamily="49" charset="0"/>
-              </a:rPr>
-              <a:t>)</a:t>
-            </a:r>
-          </a:p>
-          <a:p>
-            <a:r>
-              <a:rPr lang="en-US" dirty="0"/>
-              <a:t>	 </a:t>
-            </a:r>
-            <a:r>
-              <a:rPr lang="en-US" dirty="0">
-                <a:latin typeface="Consolas" panose="020B0609020204030204" pitchFamily="49" charset="0"/>
-              </a:rPr>
-              <a:t>=&gt; </a:t>
-            </a:r>
-            <a:r>
-              <a:rPr lang="en-US" dirty="0" err="1">
-                <a:latin typeface="Consolas" panose="020B0609020204030204" pitchFamily="49" charset="0"/>
-              </a:rPr>
-              <a:t>optionsBuilder.LogTo</a:t>
-            </a:r>
-            <a:r>
-              <a:rPr lang="en-US" dirty="0">
-                <a:latin typeface="Consolas" panose="020B0609020204030204" pitchFamily="49" charset="0"/>
-              </a:rPr>
-              <a:t>(</a:t>
-            </a:r>
-            <a:r>
-              <a:rPr lang="en-US" dirty="0" err="1">
-                <a:latin typeface="Consolas" panose="020B0609020204030204" pitchFamily="49" charset="0"/>
-              </a:rPr>
-              <a:t>Console.WriteLine</a:t>
-            </a:r>
-            <a:r>
-              <a:rPr lang="en-US" dirty="0">
-                <a:latin typeface="Consolas" panose="020B0609020204030204" pitchFamily="49" charset="0"/>
-              </a:rPr>
-              <a:t>);</a:t>
-            </a:r>
-            <a:endParaRPr lang="en-US" dirty="0">
               <a:solidFill>
                 <a:srgbClr val="000000"/>
               </a:solidFill>
@@ -22246,6 +22438,11 @@
           </p:cNvGraphicFramePr>
           <p:nvPr>
             <p:ph idx="1"/>
+            <p:extLst>
+              <p:ext uri="{D42A27DB-BD31-4B8C-83A1-F6EECF244321}">
+                <p14:modId xmlns:p14="http://schemas.microsoft.com/office/powerpoint/2010/main" val="3405073582"/>
+              </p:ext>
+            </p:extLst>
           </p:nvPr>
         </p:nvGraphicFramePr>
         <p:xfrm>
@@ -22304,7 +22501,7 @@
                                         <p:tgtEl>
                                           <p:spTgt spid="6">
                                             <p:graphicEl>
-                                              <a:chart seriesIdx="1" categoryIdx="-4" bldStep="series"/>
+                                              <a:chart seriesIdx="-3" categoryIdx="-3" bldStep="gridLegend"/>
                                             </p:graphicEl>
                                           </p:spTgt>
                                         </p:tgtEl>
@@ -22322,7 +22519,7 @@
                                         <p:tgtEl>
                                           <p:spTgt spid="6">
                                             <p:graphicEl>
-                                              <a:chart seriesIdx="1" categoryIdx="-4" bldStep="series"/>
+                                              <a:chart seriesIdx="-3" categoryIdx="-3" bldStep="gridLegend"/>
                                             </p:graphicEl>
                                           </p:spTgt>
                                         </p:tgtEl>
@@ -22365,7 +22562,7 @@
                                         <p:tgtEl>
                                           <p:spTgt spid="6">
                                             <p:graphicEl>
-                                              <a:chart seriesIdx="2" categoryIdx="-4" bldStep="series"/>
+                                              <a:chart seriesIdx="0" categoryIdx="-4" bldStep="series"/>
                                             </p:graphicEl>
                                           </p:spTgt>
                                         </p:tgtEl>
@@ -22383,7 +22580,7 @@
                                         <p:tgtEl>
                                           <p:spTgt spid="6">
                                             <p:graphicEl>
-                                              <a:chart seriesIdx="2" categoryIdx="-4" bldStep="series"/>
+                                              <a:chart seriesIdx="0" categoryIdx="-4" bldStep="series"/>
                                             </p:graphicEl>
                                           </p:spTgt>
                                         </p:tgtEl>
@@ -22426,7 +22623,7 @@
                                         <p:tgtEl>
                                           <p:spTgt spid="6">
                                             <p:graphicEl>
-                                              <a:chart seriesIdx="3" categoryIdx="-4" bldStep="series"/>
+                                              <a:chart seriesIdx="1" categoryIdx="-4" bldStep="series"/>
                                             </p:graphicEl>
                                           </p:spTgt>
                                         </p:tgtEl>
@@ -22444,7 +22641,312 @@
                                         <p:tgtEl>
                                           <p:spTgt spid="6">
                                             <p:graphicEl>
+                                              <a:chart seriesIdx="1" categoryIdx="-4" bldStep="series"/>
+                                            </p:graphicEl>
+                                          </p:spTgt>
+                                        </p:tgtEl>
+                                      </p:cBhvr>
+                                    </p:animEffect>
+                                  </p:childTnLst>
+                                </p:cTn>
+                              </p:par>
+                            </p:childTnLst>
+                          </p:cTn>
+                        </p:par>
+                      </p:childTnLst>
+                    </p:cTn>
+                  </p:par>
+                  <p:par>
+                    <p:cTn id="18" fill="hold">
+                      <p:stCondLst>
+                        <p:cond delay="indefinite"/>
+                      </p:stCondLst>
+                      <p:childTnLst>
+                        <p:par>
+                          <p:cTn id="19" fill="hold">
+                            <p:stCondLst>
+                              <p:cond delay="0"/>
+                            </p:stCondLst>
+                            <p:childTnLst>
+                              <p:par>
+                                <p:cTn id="20" presetID="22" presetClass="entr" presetSubtype="4" fill="hold" grpId="0" nodeType="clickEffect">
+                                  <p:stCondLst>
+                                    <p:cond delay="0"/>
+                                  </p:stCondLst>
+                                  <p:childTnLst>
+                                    <p:set>
+                                      <p:cBhvr>
+                                        <p:cTn id="21" dur="1" fill="hold">
+                                          <p:stCondLst>
+                                            <p:cond delay="0"/>
+                                          </p:stCondLst>
+                                        </p:cTn>
+                                        <p:tgtEl>
+                                          <p:spTgt spid="6">
+                                            <p:graphicEl>
+                                              <a:chart seriesIdx="2" categoryIdx="-4" bldStep="series"/>
+                                            </p:graphicEl>
+                                          </p:spTgt>
+                                        </p:tgtEl>
+                                        <p:attrNameLst>
+                                          <p:attrName>style.visibility</p:attrName>
+                                        </p:attrNameLst>
+                                      </p:cBhvr>
+                                      <p:to>
+                                        <p:strVal val="visible"/>
+                                      </p:to>
+                                    </p:set>
+                                    <p:animEffect transition="in" filter="wipe(down)">
+                                      <p:cBhvr>
+                                        <p:cTn id="22" dur="500"/>
+                                        <p:tgtEl>
+                                          <p:spTgt spid="6">
+                                            <p:graphicEl>
+                                              <a:chart seriesIdx="2" categoryIdx="-4" bldStep="series"/>
+                                            </p:graphicEl>
+                                          </p:spTgt>
+                                        </p:tgtEl>
+                                      </p:cBhvr>
+                                    </p:animEffect>
+                                  </p:childTnLst>
+                                </p:cTn>
+                              </p:par>
+                            </p:childTnLst>
+                          </p:cTn>
+                        </p:par>
+                      </p:childTnLst>
+                    </p:cTn>
+                  </p:par>
+                  <p:par>
+                    <p:cTn id="23" fill="hold">
+                      <p:stCondLst>
+                        <p:cond delay="indefinite"/>
+                      </p:stCondLst>
+                      <p:childTnLst>
+                        <p:par>
+                          <p:cTn id="24" fill="hold">
+                            <p:stCondLst>
+                              <p:cond delay="0"/>
+                            </p:stCondLst>
+                            <p:childTnLst>
+                              <p:par>
+                                <p:cTn id="25" presetID="22" presetClass="entr" presetSubtype="4" fill="hold" grpId="0" nodeType="clickEffect">
+                                  <p:stCondLst>
+                                    <p:cond delay="0"/>
+                                  </p:stCondLst>
+                                  <p:childTnLst>
+                                    <p:set>
+                                      <p:cBhvr>
+                                        <p:cTn id="26" dur="1" fill="hold">
+                                          <p:stCondLst>
+                                            <p:cond delay="0"/>
+                                          </p:stCondLst>
+                                        </p:cTn>
+                                        <p:tgtEl>
+                                          <p:spTgt spid="6">
+                                            <p:graphicEl>
                                               <a:chart seriesIdx="3" categoryIdx="-4" bldStep="series"/>
+                                            </p:graphicEl>
+                                          </p:spTgt>
+                                        </p:tgtEl>
+                                        <p:attrNameLst>
+                                          <p:attrName>style.visibility</p:attrName>
+                                        </p:attrNameLst>
+                                      </p:cBhvr>
+                                      <p:to>
+                                        <p:strVal val="visible"/>
+                                      </p:to>
+                                    </p:set>
+                                    <p:animEffect transition="in" filter="wipe(down)">
+                                      <p:cBhvr>
+                                        <p:cTn id="27" dur="500"/>
+                                        <p:tgtEl>
+                                          <p:spTgt spid="6">
+                                            <p:graphicEl>
+                                              <a:chart seriesIdx="3" categoryIdx="-4" bldStep="series"/>
+                                            </p:graphicEl>
+                                          </p:spTgt>
+                                        </p:tgtEl>
+                                      </p:cBhvr>
+                                    </p:animEffect>
+                                  </p:childTnLst>
+                                </p:cTn>
+                              </p:par>
+                            </p:childTnLst>
+                          </p:cTn>
+                        </p:par>
+                      </p:childTnLst>
+                    </p:cTn>
+                  </p:par>
+                  <p:par>
+                    <p:cTn id="28" fill="hold">
+                      <p:stCondLst>
+                        <p:cond delay="indefinite"/>
+                      </p:stCondLst>
+                      <p:childTnLst>
+                        <p:par>
+                          <p:cTn id="29" fill="hold">
+                            <p:stCondLst>
+                              <p:cond delay="0"/>
+                            </p:stCondLst>
+                            <p:childTnLst>
+                              <p:par>
+                                <p:cTn id="30" presetID="22" presetClass="entr" presetSubtype="4" fill="hold" grpId="0" nodeType="clickEffect">
+                                  <p:stCondLst>
+                                    <p:cond delay="0"/>
+                                  </p:stCondLst>
+                                  <p:childTnLst>
+                                    <p:set>
+                                      <p:cBhvr>
+                                        <p:cTn id="31" dur="1" fill="hold">
+                                          <p:stCondLst>
+                                            <p:cond delay="0"/>
+                                          </p:stCondLst>
+                                        </p:cTn>
+                                        <p:tgtEl>
+                                          <p:spTgt spid="6">
+                                            <p:graphicEl>
+                                              <a:chart seriesIdx="4" categoryIdx="-4" bldStep="series"/>
+                                            </p:graphicEl>
+                                          </p:spTgt>
+                                        </p:tgtEl>
+                                        <p:attrNameLst>
+                                          <p:attrName>style.visibility</p:attrName>
+                                        </p:attrNameLst>
+                                      </p:cBhvr>
+                                      <p:to>
+                                        <p:strVal val="visible"/>
+                                      </p:to>
+                                    </p:set>
+                                    <p:animEffect transition="in" filter="wipe(down)">
+                                      <p:cBhvr>
+                                        <p:cTn id="32" dur="500"/>
+                                        <p:tgtEl>
+                                          <p:spTgt spid="6">
+                                            <p:graphicEl>
+                                              <a:chart seriesIdx="4" categoryIdx="-4" bldStep="series"/>
+                                            </p:graphicEl>
+                                          </p:spTgt>
+                                        </p:tgtEl>
+                                      </p:cBhvr>
+                                    </p:animEffect>
+                                  </p:childTnLst>
+                                </p:cTn>
+                              </p:par>
+                            </p:childTnLst>
+                          </p:cTn>
+                        </p:par>
+                      </p:childTnLst>
+                    </p:cTn>
+                  </p:par>
+                  <p:par>
+                    <p:cTn id="33" fill="hold">
+                      <p:stCondLst>
+                        <p:cond delay="indefinite"/>
+                      </p:stCondLst>
+                      <p:childTnLst>
+                        <p:par>
+                          <p:cTn id="34" fill="hold">
+                            <p:stCondLst>
+                              <p:cond delay="0"/>
+                            </p:stCondLst>
+                            <p:childTnLst>
+                              <p:par>
+                                <p:cTn id="35" presetID="22" presetClass="entr" presetSubtype="4" fill="hold" grpId="0" nodeType="clickEffect">
+                                  <p:stCondLst>
+                                    <p:cond delay="0"/>
+                                  </p:stCondLst>
+                                  <p:childTnLst>
+                                    <p:set>
+                                      <p:cBhvr>
+                                        <p:cTn id="36" dur="1" fill="hold">
+                                          <p:stCondLst>
+                                            <p:cond delay="0"/>
+                                          </p:stCondLst>
+                                        </p:cTn>
+                                        <p:tgtEl>
+                                          <p:spTgt spid="6">
+                                            <p:graphicEl>
+                                              <a:chart seriesIdx="5" categoryIdx="-4" bldStep="series"/>
+                                            </p:graphicEl>
+                                          </p:spTgt>
+                                        </p:tgtEl>
+                                        <p:attrNameLst>
+                                          <p:attrName>style.visibility</p:attrName>
+                                        </p:attrNameLst>
+                                      </p:cBhvr>
+                                      <p:to>
+                                        <p:strVal val="visible"/>
+                                      </p:to>
+                                    </p:set>
+                                    <p:animEffect transition="in" filter="wipe(down)">
+                                      <p:cBhvr>
+                                        <p:cTn id="37" dur="500"/>
+                                        <p:tgtEl>
+                                          <p:spTgt spid="6">
+                                            <p:graphicEl>
+                                              <a:chart seriesIdx="5" categoryIdx="-4" bldStep="series"/>
+                                            </p:graphicEl>
+                                          </p:spTgt>
+                                        </p:tgtEl>
+                                      </p:cBhvr>
+                                    </p:animEffect>
+                                  </p:childTnLst>
+                                </p:cTn>
+                              </p:par>
+                            </p:childTnLst>
+                          </p:cTn>
+                        </p:par>
+                      </p:childTnLst>
+                    </p:cTn>
+                  </p:par>
+                  <p:par>
+                    <p:cTn id="38" fill="hold">
+                      <p:stCondLst>
+                        <p:cond delay="indefinite"/>
+                      </p:stCondLst>
+                      <p:childTnLst>
+                        <p:par>
+                          <p:cTn id="39" fill="hold">
+                            <p:stCondLst>
+                              <p:cond delay="0"/>
+                            </p:stCondLst>
+                            <p:childTnLst>
+                              <p:par>
+                                <p:cTn id="40" presetID="22" presetClass="entr" presetSubtype="4" fill="hold" grpId="0" nodeType="clickEffect">
+                                  <p:stCondLst>
+                                    <p:cond delay="0"/>
+                                  </p:stCondLst>
+                                  <p:childTnLst>
+                                    <p:set>
+                                      <p:cBhvr>
+                                        <p:cTn id="41" dur="1" fill="hold">
+                                          <p:stCondLst>
+                                            <p:cond delay="0"/>
+                                          </p:stCondLst>
+                                        </p:cTn>
+                                        <p:tgtEl>
+                                          <p:spTgt spid="6">
+                                            <p:graphicEl>
+                                              <a:chart seriesIdx="6" categoryIdx="-4" bldStep="series"/>
+                                            </p:graphicEl>
+                                          </p:spTgt>
+                                        </p:tgtEl>
+                                        <p:attrNameLst>
+                                          <p:attrName>style.visibility</p:attrName>
+                                        </p:attrNameLst>
+                                      </p:cBhvr>
+                                      <p:to>
+                                        <p:strVal val="visible"/>
+                                      </p:to>
+                                    </p:set>
+                                    <p:animEffect transition="in" filter="wipe(down)">
+                                      <p:cBhvr>
+                                        <p:cTn id="42" dur="500"/>
+                                        <p:tgtEl>
+                                          <p:spTgt spid="6">
+                                            <p:graphicEl>
+                                              <a:chart seriesIdx="6" categoryIdx="-4" bldStep="series"/>
                                             </p:graphicEl>
                                           </p:spTgt>
                                         </p:tgtEl>
@@ -23999,7 +24501,7 @@
 </file>
 
 <file path=ppt/slides/slide3.xml><?xml version="1.0" encoding="utf-8"?>
-<p:sld xmlns:a="http://schemas.openxmlformats.org/drawingml/2006/main" xmlns:r="http://schemas.openxmlformats.org/officeDocument/2006/relationships" xmlns:p="http://schemas.openxmlformats.org/presentationml/2006/main">
+<p:sld xmlns:a="http://schemas.openxmlformats.org/drawingml/2006/main" xmlns:r="http://schemas.openxmlformats.org/officeDocument/2006/relationships" xmlns:p="http://schemas.openxmlformats.org/presentationml/2006/main" show="0">
   <p:cSld>
     <p:spTree>
       <p:nvGrpSpPr>
@@ -28492,9 +28994,12 @@
 </file>
 
 <file path=customXml/item1.xml><?xml version="1.0" encoding="utf-8"?>
-<p:properties xmlns:p="http://schemas.microsoft.com/office/2006/metadata/properties" xmlns:xsi="http://www.w3.org/2001/XMLSchema-instance" xmlns:pc="http://schemas.microsoft.com/office/infopath/2007/PartnerControls">
-  <documentManagement/>
-</p:properties>
+<?mso-contentType ?>
+<FormTemplates xmlns="http://schemas.microsoft.com/sharepoint/v3/contenttype/forms">
+  <Display>DocumentLibraryForm</Display>
+  <Edit>DocumentLibraryForm</Edit>
+  <New>DocumentLibraryForm</New>
+</FormTemplates>
 </file>
 
 <file path=customXml/item2.xml><?xml version="1.0" encoding="utf-8"?>
@@ -28612,25 +29117,15 @@
 </file>
 
 <file path=customXml/item3.xml><?xml version="1.0" encoding="utf-8"?>
-<?mso-contentType ?>
-<FormTemplates xmlns="http://schemas.microsoft.com/sharepoint/v3/contenttype/forms">
-  <Display>DocumentLibraryForm</Display>
-  <Edit>DocumentLibraryForm</Edit>
-  <New>DocumentLibraryForm</New>
-</FormTemplates>
+<p:properties xmlns:p="http://schemas.microsoft.com/office/2006/metadata/properties" xmlns:xsi="http://www.w3.org/2001/XMLSchema-instance" xmlns:pc="http://schemas.microsoft.com/office/infopath/2007/PartnerControls">
+  <documentManagement/>
+</p:properties>
 </file>
 
 <file path=customXml/itemProps1.xml><?xml version="1.0" encoding="utf-8"?>
-<ds:datastoreItem xmlns:ds="http://schemas.openxmlformats.org/officeDocument/2006/customXml" ds:itemID="{310BA9E4-2DAA-49B9-9D9A-1DC7F9CCA4D9}">
+<ds:datastoreItem xmlns:ds="http://schemas.openxmlformats.org/officeDocument/2006/customXml" ds:itemID="{34511AA7-8D46-42C1-969B-5E843ADBDC40}">
   <ds:schemaRefs>
-    <ds:schemaRef ds:uri="http://schemas.microsoft.com/office/infopath/2007/PartnerControls"/>
-    <ds:schemaRef ds:uri="http://purl.org/dc/elements/1.1/"/>
-    <ds:schemaRef ds:uri="http://schemas.microsoft.com/office/2006/metadata/properties"/>
-    <ds:schemaRef ds:uri="http://purl.org/dc/terms/"/>
-    <ds:schemaRef ds:uri="http://schemas.openxmlformats.org/package/2006/metadata/core-properties"/>
-    <ds:schemaRef ds:uri="http://schemas.microsoft.com/office/2006/documentManagement/types"/>
-    <ds:schemaRef ds:uri="http://www.w3.org/XML/1998/namespace"/>
-    <ds:schemaRef ds:uri="http://purl.org/dc/dcmitype/"/>
+    <ds:schemaRef ds:uri="http://schemas.microsoft.com/sharepoint/v3/contenttype/forms"/>
   </ds:schemaRefs>
 </ds:datastoreItem>
 </file>
@@ -28652,9 +29147,16 @@
 </file>
 
 <file path=customXml/itemProps3.xml><?xml version="1.0" encoding="utf-8"?>
-<ds:datastoreItem xmlns:ds="http://schemas.openxmlformats.org/officeDocument/2006/customXml" ds:itemID="{34511AA7-8D46-42C1-969B-5E843ADBDC40}">
+<ds:datastoreItem xmlns:ds="http://schemas.openxmlformats.org/officeDocument/2006/customXml" ds:itemID="{310BA9E4-2DAA-49B9-9D9A-1DC7F9CCA4D9}">
   <ds:schemaRefs>
-    <ds:schemaRef ds:uri="http://schemas.microsoft.com/sharepoint/v3/contenttype/forms"/>
+    <ds:schemaRef ds:uri="http://schemas.microsoft.com/office/infopath/2007/PartnerControls"/>
+    <ds:schemaRef ds:uri="http://purl.org/dc/elements/1.1/"/>
+    <ds:schemaRef ds:uri="http://schemas.microsoft.com/office/2006/metadata/properties"/>
+    <ds:schemaRef ds:uri="http://purl.org/dc/terms/"/>
+    <ds:schemaRef ds:uri="http://schemas.openxmlformats.org/package/2006/metadata/core-properties"/>
+    <ds:schemaRef ds:uri="http://schemas.microsoft.com/office/2006/documentManagement/types"/>
+    <ds:schemaRef ds:uri="http://www.w3.org/XML/1998/namespace"/>
+    <ds:schemaRef ds:uri="http://purl.org/dc/dcmitype/"/>
   </ds:schemaRefs>
 </ds:datastoreItem>
 </file>
</xml_diff>